<commit_message>
adding initial version of week11 sldies
</commit_message>
<xml_diff>
--- a/Slides/Lesson 11 Code Smells, Refactoring and Technical Debt.pptx
+++ b/Slides/Lesson 11 Code Smells, Refactoring and Technical Debt.pptx
@@ -17127,16 +17127,13 @@
             <a:pPr lvl="1"/>
             <a:r>
               <a:rPr lang="en-US" dirty="0"/>
-              <a:t>IDEs provide (usually) safe </a:t>
-            </a:r>
-            <a:r>
-              <a:rPr lang="en-US" dirty="0" err="1"/>
-              <a:t>refactorings</a:t>
-            </a:r>
-            <a:r>
-              <a:rPr lang="en-US" dirty="0"/>
-              <a:t>;</a:t>
-            </a:r>
+              <a:t>IDEs provide (usually) </a:t>
+            </a:r>
+            <a:r>
+              <a:rPr lang="en-US"/>
+              <a:t>safe refactoring;</a:t>
+            </a:r>
+            <a:endParaRPr lang="en-US" dirty="0"/>
           </a:p>
           <a:p>
             <a:pPr lvl="1"/>

</xml_diff>

<commit_message>
included slides on technical debt from new book and notes for activity
</commit_message>
<xml_diff>
--- a/Slides/Lesson 11 Code Smells, Refactoring and Technical Debt.pptx
+++ b/Slides/Lesson 11 Code Smells, Refactoring and Technical Debt.pptx
@@ -6,7 +6,7 @@
     <p:sldMasterId id="2147483662" r:id="rId2"/>
   </p:sldMasterIdLst>
   <p:notesMasterIdLst>
-    <p:notesMasterId r:id="rId26"/>
+    <p:notesMasterId r:id="rId27"/>
   </p:notesMasterIdLst>
   <p:sldIdLst>
     <p:sldId id="256" r:id="rId3"/>
@@ -27,11 +27,12 @@
     <p:sldId id="270" r:id="rId18"/>
     <p:sldId id="271" r:id="rId19"/>
     <p:sldId id="272" r:id="rId20"/>
-    <p:sldId id="409" r:id="rId21"/>
-    <p:sldId id="410" r:id="rId22"/>
-    <p:sldId id="407" r:id="rId23"/>
-    <p:sldId id="408" r:id="rId24"/>
-    <p:sldId id="376" r:id="rId25"/>
+    <p:sldId id="411" r:id="rId21"/>
+    <p:sldId id="409" r:id="rId22"/>
+    <p:sldId id="410" r:id="rId23"/>
+    <p:sldId id="407" r:id="rId24"/>
+    <p:sldId id="408" r:id="rId25"/>
+    <p:sldId id="376" r:id="rId26"/>
   </p:sldIdLst>
   <p:sldSz cx="13004800" cy="9753600"/>
   <p:notesSz cx="6858000" cy="9144000"/>
@@ -666,6 +667,33 @@
           <a:bodyPr/>
           <a:lstStyle/>
           <a:p>
+            <a:pPr marL="0" indent="0" defTabSz="584200">
+              <a:lnSpc>
+                <a:spcPct val="100000"/>
+              </a:lnSpc>
+              <a:buSzPct val="100000"/>
+              <a:buNone/>
+              <a:defRPr>
+                <a:latin typeface="Lucida Grande"/>
+                <a:ea typeface="Lucida Grande"/>
+                <a:cs typeface="Lucida Grande"/>
+                <a:sym typeface="Lucida Grande"/>
+              </a:defRPr>
+            </a:pPr>
+            <a:r>
+              <a:rPr dirty="0"/>
+              <a:t>some examples of widely used </a:t>
+            </a:r>
+            <a:r>
+              <a:rPr dirty="0" err="1"/>
+              <a:t>refactorings</a:t>
+            </a:r>
+            <a:r>
+              <a:rPr dirty="0"/>
+              <a:t> that are “local” in scope</a:t>
+            </a:r>
+          </a:p>
+          <a:p>
             <a:pPr marL="228600" indent="-228600" defTabSz="584200">
               <a:lnSpc>
                 <a:spcPct val="100000"/>
@@ -680,7 +708,8 @@
               </a:defRPr>
             </a:pPr>
             <a:r>
-              <a:t>some examples of widely used refactorings that are “local” in scope</a:t>
+              <a:rPr dirty="0"/>
+              <a:t>useful for restructuring methods</a:t>
             </a:r>
           </a:p>
           <a:p>
@@ -698,7 +727,8 @@
               </a:defRPr>
             </a:pPr>
             <a:r>
-              <a:t>useful for restructuring methods</a:t>
+              <a:rPr dirty="0"/>
+              <a:t>We already talked about bad names and duplicate code. We would fix these smells by applying refactoring rename and extract method, resp</a:t>
             </a:r>
           </a:p>
           <a:p>
@@ -716,7 +746,8 @@
               </a:defRPr>
             </a:pPr>
             <a:r>
-              <a:t>We already talked about bad names and duplicate code. We would fix these smells by applying refactoring rename and extract method, resp</a:t>
+              <a:rPr dirty="0"/>
+              <a:t>Inline method is inverse: when you want to go fold a method back into another</a:t>
             </a:r>
           </a:p>
           <a:p>
@@ -734,7 +765,8 @@
               </a:defRPr>
             </a:pPr>
             <a:r>
-              <a:t>Inline method is inverse: when you want to go fold a method back into another</a:t>
+              <a:rPr dirty="0"/>
+              <a:t>Extract local variable is like extract method, but what you might do with just an expression, so that a big expression can be more manageable</a:t>
             </a:r>
           </a:p>
           <a:p>
@@ -752,7 +784,8 @@
               </a:defRPr>
             </a:pPr>
             <a:r>
-              <a:t>Extract local variable is like extract method, but what you might do with just an expression, so that a big expression can be more manageable</a:t>
+              <a:rPr dirty="0"/>
+              <a:t>Again, inline local is the inverse: eliminating a local variable that is maybe superfluous</a:t>
             </a:r>
           </a:p>
           <a:p>
@@ -770,24 +803,7 @@
               </a:defRPr>
             </a:pPr>
             <a:r>
-              <a:t>Again, inline local is the inverse: eliminating a local variable that is maybe superfluous</a:t>
-            </a:r>
-          </a:p>
-          <a:p>
-            <a:pPr marL="228600" indent="-228600" defTabSz="584200">
-              <a:lnSpc>
-                <a:spcPct val="100000"/>
-              </a:lnSpc>
-              <a:buSzPct val="100000"/>
-              <a:buChar char="•"/>
-              <a:defRPr>
-                <a:latin typeface="Lucida Grande"/>
-                <a:ea typeface="Lucida Grande"/>
-                <a:cs typeface="Lucida Grande"/>
-                <a:sym typeface="Lucida Grande"/>
-              </a:defRPr>
-            </a:pPr>
-            <a:r>
+              <a:rPr dirty="0"/>
               <a:t>Change function declaration lets us adapt the order of parameters on a method</a:t>
             </a:r>
           </a:p>
@@ -806,6 +822,7 @@
               </a:defRPr>
             </a:pPr>
             <a:r>
+              <a:rPr dirty="0"/>
               <a:t>encapsulate a field replaces direct field accesses with getters/setters, and </a:t>
             </a:r>
           </a:p>
@@ -824,6 +841,7 @@
               </a:defRPr>
             </a:pPr>
             <a:r>
+              <a:rPr dirty="0"/>
               <a:t>Convert local to field creates a field with the specified scope to replace a local variable.</a:t>
             </a:r>
           </a:p>
@@ -842,7 +860,16 @@
               </a:defRPr>
             </a:pPr>
             <a:r>
-              <a:t>These are just a few of the hundreds of refactorings in Fowler’s book</a:t>
+              <a:rPr dirty="0"/>
+              <a:t>These are just a few of the hundreds of </a:t>
+            </a:r>
+            <a:r>
+              <a:rPr dirty="0" err="1"/>
+              <a:t>refactorings</a:t>
+            </a:r>
+            <a:r>
+              <a:rPr dirty="0"/>
+              <a:t> in Fowler’s book</a:t>
             </a:r>
           </a:p>
         </p:txBody>
@@ -1087,21 +1114,206 @@
           <a:lstStyle/>
           <a:p>
             <a:r>
+              <a:rPr lang="en-US" dirty="0"/>
+              <a:t>Ward Cunningham introduced the term “Technical Debt” in 1992 to communicate the delicate balance between speed and rework in pursuit of delivering functioning quality software. You can think of technical debt as an analogy with friction in mechanical devices; the more friction a device experiences due to wear and tear, lack of lubrication, or bad design, the harder it is to move the device, and the more energy you have to apply to get the original effect. At the same time, friction is a necessary condition of mechanical parts working together. You cannot eliminate it completely; you can only reduce its impact.</a:t>
+            </a:r>
+          </a:p>
+          <a:p>
+            <a:endParaRPr lang="en-US" dirty="0"/>
+          </a:p>
+          <a:p>
+            <a:r>
+              <a:rPr lang="en-US" dirty="0"/>
               <a:t>If programmers spend time “cleaning up the code”, then that’s less time spent implementing required functionality - and the schedule is slipping as it is!</a:t>
             </a:r>
           </a:p>
           <a:p>
-            <a:r>
+            <a:endParaRPr lang="en-US" dirty="0"/>
+          </a:p>
+          <a:p>
+            <a:r>
+              <a:rPr lang="en-US" dirty="0"/>
               <a:t>Refactoring can break code that previously worked</a:t>
             </a:r>
           </a:p>
           <a:p>
+            <a:endParaRPr lang="en-US" dirty="0"/>
+          </a:p>
+        </p:txBody>
+      </p:sp>
+    </p:spTree>
+    <p:extLst>
+      <p:ext uri="{BB962C8B-B14F-4D97-AF65-F5344CB8AC3E}">
+        <p14:creationId xmlns:p14="http://schemas.microsoft.com/office/powerpoint/2010/main" val="1801496249"/>
+      </p:ext>
+    </p:extLst>
+  </p:cSld>
+  <p:clrMapOvr>
+    <a:masterClrMapping/>
+  </p:clrMapOvr>
+</p:notes>
+</file>
+
+<file path=ppt/notesSlides/notesSlide14.xml><?xml version="1.0" encoding="utf-8"?>
+<p:notes xmlns:a="http://schemas.openxmlformats.org/drawingml/2006/main" xmlns:r="http://schemas.openxmlformats.org/officeDocument/2006/relationships" xmlns:p="http://schemas.openxmlformats.org/presentationml/2006/main">
+  <p:cSld>
+    <p:spTree>
+      <p:nvGrpSpPr>
+        <p:cNvPr id="1" name=""/>
+        <p:cNvGrpSpPr/>
+        <p:nvPr/>
+      </p:nvGrpSpPr>
+      <p:grpSpPr>
+        <a:xfrm>
+          <a:off x="0" y="0"/>
+          <a:ext cx="0" cy="0"/>
+          <a:chOff x="0" y="0"/>
+          <a:chExt cx="0" cy="0"/>
+        </a:xfrm>
+      </p:grpSpPr>
+      <p:sp>
+        <p:nvSpPr>
+          <p:cNvPr id="234" name="Shape 234"/>
+          <p:cNvSpPr>
+            <a:spLocks noGrp="1" noRot="1" noChangeAspect="1"/>
+          </p:cNvSpPr>
+          <p:nvPr>
+            <p:ph type="sldImg"/>
+          </p:nvPr>
+        </p:nvSpPr>
+        <p:spPr>
+          <a:prstGeom prst="rect">
+            <a:avLst/>
+          </a:prstGeom>
+        </p:spPr>
+        <p:txBody>
+          <a:bodyPr/>
+          <a:lstStyle/>
+          <a:p>
             <a:endParaRPr/>
           </a:p>
-          <a:p>
-            <a:r>
-              <a:t>Refactoring needs to be systematic, incremental, and safe</a:t>
-            </a:r>
+        </p:txBody>
+      </p:sp>
+      <p:sp>
+        <p:nvSpPr>
+          <p:cNvPr id="235" name="Shape 235"/>
+          <p:cNvSpPr>
+            <a:spLocks noGrp="1"/>
+          </p:cNvSpPr>
+          <p:nvPr>
+            <p:ph type="body" sz="quarter" idx="1"/>
+          </p:nvPr>
+        </p:nvSpPr>
+        <p:spPr>
+          <a:prstGeom prst="rect">
+            <a:avLst/>
+          </a:prstGeom>
+        </p:spPr>
+        <p:txBody>
+          <a:bodyPr/>
+          <a:lstStyle/>
+          <a:p>
+            <a:r>
+              <a:rPr lang="en-US" dirty="0"/>
+              <a:t>More details in this book: https://learning.oreilly.com/library/view/managing-technical-debt/9780135646052/ </a:t>
+            </a:r>
+          </a:p>
+          <a:p>
+            <a:pPr lvl="1">
+              <a:spcBef>
+                <a:spcPts val="1200"/>
+              </a:spcBef>
+            </a:pPr>
+            <a:r>
+              <a:rPr lang="en-US" sz="2400" b="1" dirty="0"/>
+              <a:t>Quick-and-Dirty if-then-else:</a:t>
+            </a:r>
+            <a:r>
+              <a:rPr lang="en-US" sz="2400" dirty="0"/>
+              <a:t> A quick and dirty solution for a smaller market might prompt the need for another larger change which can no longer be quick and dirty. Like adding support for one </a:t>
+            </a:r>
+            <a:r>
+              <a:rPr lang="en-US" sz="2400" dirty="0" err="1"/>
+              <a:t>langage</a:t>
+            </a:r>
+            <a:r>
+              <a:rPr lang="en-US" sz="2400" dirty="0"/>
+              <a:t> but then needing support for other languages.</a:t>
+            </a:r>
+          </a:p>
+          <a:p>
+            <a:pPr lvl="1">
+              <a:spcBef>
+                <a:spcPts val="1200"/>
+              </a:spcBef>
+            </a:pPr>
+            <a:r>
+              <a:rPr lang="en-US" sz="2400" b="1" dirty="0"/>
+              <a:t>Hitting the Wall:</a:t>
+            </a:r>
+            <a:r>
+              <a:rPr lang="en-US" sz="2400" dirty="0"/>
+              <a:t> when a company develops a lot of code for demos (with new and new features) without any plan for overall architecture, they will eventually hit a wall and the developers will no longer to able to do anything due to </a:t>
+            </a:r>
+            <a:r>
+              <a:rPr lang="en-US" sz="2000" dirty="0"/>
+              <a:t>scalability, data management, distribution of the system, and security issues</a:t>
+            </a:r>
+            <a:endParaRPr lang="en-US" sz="2400" dirty="0"/>
+          </a:p>
+          <a:p>
+            <a:pPr lvl="1">
+              <a:spcBef>
+                <a:spcPts val="1200"/>
+              </a:spcBef>
+            </a:pPr>
+            <a:r>
+              <a:rPr lang="en-US" sz="2400" b="1" dirty="0"/>
+              <a:t>Crumbling Under the Load</a:t>
+            </a:r>
+            <a:r>
+              <a:rPr lang="en-US" sz="2400" dirty="0"/>
+              <a:t>: there was no single cause of technical debt. There were hundreds of causes: code imperfections, tricks, and workarounds, compounded by no usable documentation and little automated testing. While the development team dreams of a complete rewrite, the economic situation does not allow delaying new releases or new products or abandoning support for older products.</a:t>
+            </a:r>
+          </a:p>
+          <a:p>
+            <a:pPr lvl="1">
+              <a:spcBef>
+                <a:spcPts val="1200"/>
+              </a:spcBef>
+            </a:pPr>
+            <a:r>
+              <a:rPr lang="en-US" sz="2400" b="1" dirty="0"/>
+              <a:t>Death by a Thousand Cuts</a:t>
+            </a:r>
+            <a:r>
+              <a:rPr lang="en-US" sz="2400" dirty="0"/>
+              <a:t>:  a pervasive lack of competence can result in many small, avoidable coding issues that are never caught. Lack of organizational competency—as in the case of this IT-service organization—easily activates a number of cascading effects. The unplanned and unmanaged hiring boom, the missed opportunity to enforce commonality across the products, and the limited testing all contributed to the accumulating technical debt.</a:t>
+            </a:r>
+          </a:p>
+          <a:p>
+            <a:pPr lvl="1">
+              <a:spcBef>
+                <a:spcPts val="1200"/>
+              </a:spcBef>
+            </a:pPr>
+            <a:r>
+              <a:rPr lang="en-US" sz="2400" b="1" dirty="0"/>
+              <a:t>Tactical Investment</a:t>
+            </a:r>
+            <a:r>
+              <a:rPr lang="en-US" sz="2400" dirty="0"/>
+              <a:t>: A small company started developing a web application for targeted users without exact requirement using “I’ll know it when I see it” philosophy. While developing a “minimum viable product” (MVP) with some core functionality and little underlying sophistication. Members of the company invested heavily in building the right infrastructure for a product that would be able to support millions of simultaneous users and adapt to dozens of situations and cities. </a:t>
+            </a:r>
+            <a:r>
+              <a:rPr lang="en-US" sz="2000" dirty="0"/>
+              <a:t>They were aware of the deliberate shortcuts they were taking and their consequences on future development and made it very clear to everyone, internal and external, that the shortcuts were temporary solutions so that no one would be tempted to keep them, painfully patched, as part of the permanent solution.</a:t>
+            </a:r>
+            <a:r>
+              <a:rPr lang="en-US" sz="2400" dirty="0"/>
+              <a:t> In this manner, taking on technical debt was a wise investment that paid off. The company repaid the “borrowed time,” but it could also have walked away from the project.</a:t>
+            </a:r>
+            <a:endParaRPr dirty="0"/>
           </a:p>
         </p:txBody>
       </p:sp>
@@ -1109,6 +1321,239 @@
     <p:extLst>
       <p:ext uri="{BB962C8B-B14F-4D97-AF65-F5344CB8AC3E}">
         <p14:creationId xmlns:p14="http://schemas.microsoft.com/office/powerpoint/2010/main" val="1769597273"/>
+      </p:ext>
+    </p:extLst>
+  </p:cSld>
+  <p:clrMapOvr>
+    <a:masterClrMapping/>
+  </p:clrMapOvr>
+</p:notes>
+</file>
+
+<file path=ppt/notesSlides/notesSlide15.xml><?xml version="1.0" encoding="utf-8"?>
+<p:notes xmlns:a="http://schemas.openxmlformats.org/drawingml/2006/main" xmlns:r="http://schemas.openxmlformats.org/officeDocument/2006/relationships" xmlns:p="http://schemas.openxmlformats.org/presentationml/2006/main">
+  <p:cSld>
+    <p:spTree>
+      <p:nvGrpSpPr>
+        <p:cNvPr id="1" name=""/>
+        <p:cNvGrpSpPr/>
+        <p:nvPr/>
+      </p:nvGrpSpPr>
+      <p:grpSpPr>
+        <a:xfrm>
+          <a:off x="0" y="0"/>
+          <a:ext cx="0" cy="0"/>
+          <a:chOff x="0" y="0"/>
+          <a:chExt cx="0" cy="0"/>
+        </a:xfrm>
+      </p:grpSpPr>
+      <p:sp>
+        <p:nvSpPr>
+          <p:cNvPr id="2" name="Slide Image Placeholder 1"/>
+          <p:cNvSpPr>
+            <a:spLocks noGrp="1" noRot="1" noChangeAspect="1"/>
+          </p:cNvSpPr>
+          <p:nvPr>
+            <p:ph type="sldImg"/>
+          </p:nvPr>
+        </p:nvSpPr>
+        <p:spPr/>
+      </p:sp>
+      <p:sp>
+        <p:nvSpPr>
+          <p:cNvPr id="3" name="Notes Placeholder 2"/>
+          <p:cNvSpPr>
+            <a:spLocks noGrp="1"/>
+          </p:cNvSpPr>
+          <p:nvPr>
+            <p:ph type="body" idx="1"/>
+          </p:nvPr>
+        </p:nvSpPr>
+        <p:spPr/>
+        <p:txBody>
+          <a:bodyPr/>
+          <a:lstStyle/>
+          <a:p>
+            <a:pPr marL="0" marR="0" lvl="0" indent="0" defTabSz="457200" eaLnBrk="1" fontAlgn="auto" latinLnBrk="0" hangingPunct="1">
+              <a:lnSpc>
+                <a:spcPct val="117999"/>
+              </a:lnSpc>
+              <a:spcBef>
+                <a:spcPts val="0"/>
+              </a:spcBef>
+              <a:spcAft>
+                <a:spcPts val="0"/>
+              </a:spcAft>
+              <a:buClrTx/>
+              <a:buSzTx/>
+              <a:buFontTx/>
+              <a:buNone/>
+              <a:tabLst/>
+              <a:defRPr/>
+            </a:pPr>
+            <a:r>
+              <a:rPr lang="en-US" dirty="0"/>
+              <a:t>Refactoring needs to be systematic, incremental, and safe</a:t>
+            </a:r>
+          </a:p>
+          <a:p>
+            <a:endParaRPr lang="en-US" dirty="0"/>
+          </a:p>
+        </p:txBody>
+      </p:sp>
+    </p:spTree>
+    <p:extLst>
+      <p:ext uri="{BB962C8B-B14F-4D97-AF65-F5344CB8AC3E}">
+        <p14:creationId xmlns:p14="http://schemas.microsoft.com/office/powerpoint/2010/main" val="1047769406"/>
+      </p:ext>
+    </p:extLst>
+  </p:cSld>
+  <p:clrMapOvr>
+    <a:masterClrMapping/>
+  </p:clrMapOvr>
+</p:notes>
+</file>
+
+<file path=ppt/notesSlides/notesSlide16.xml><?xml version="1.0" encoding="utf-8"?>
+<p:notes xmlns:a="http://schemas.openxmlformats.org/drawingml/2006/main" xmlns:r="http://schemas.openxmlformats.org/officeDocument/2006/relationships" xmlns:p="http://schemas.openxmlformats.org/presentationml/2006/main">
+  <p:cSld>
+    <p:spTree>
+      <p:nvGrpSpPr>
+        <p:cNvPr id="1" name=""/>
+        <p:cNvGrpSpPr/>
+        <p:nvPr/>
+      </p:nvGrpSpPr>
+      <p:grpSpPr>
+        <a:xfrm>
+          <a:off x="0" y="0"/>
+          <a:ext cx="0" cy="0"/>
+          <a:chOff x="0" y="0"/>
+          <a:chExt cx="0" cy="0"/>
+        </a:xfrm>
+      </p:grpSpPr>
+      <p:sp>
+        <p:nvSpPr>
+          <p:cNvPr id="2" name="Slide Image Placeholder 1"/>
+          <p:cNvSpPr>
+            <a:spLocks noGrp="1" noRot="1" noChangeAspect="1"/>
+          </p:cNvSpPr>
+          <p:nvPr>
+            <p:ph type="sldImg"/>
+          </p:nvPr>
+        </p:nvSpPr>
+        <p:spPr/>
+      </p:sp>
+      <p:sp>
+        <p:nvSpPr>
+          <p:cNvPr id="3" name="Notes Placeholder 2"/>
+          <p:cNvSpPr>
+            <a:spLocks noGrp="1"/>
+          </p:cNvSpPr>
+          <p:nvPr>
+            <p:ph type="body" idx="1"/>
+          </p:nvPr>
+        </p:nvSpPr>
+        <p:spPr/>
+        <p:txBody>
+          <a:bodyPr/>
+          <a:lstStyle/>
+          <a:p>
+            <a:r>
+              <a:rPr lang="en-US" dirty="0"/>
+              <a:t>&lt;read slide&gt;</a:t>
+            </a:r>
+          </a:p>
+        </p:txBody>
+      </p:sp>
+    </p:spTree>
+    <p:extLst>
+      <p:ext uri="{BB962C8B-B14F-4D97-AF65-F5344CB8AC3E}">
+        <p14:creationId xmlns:p14="http://schemas.microsoft.com/office/powerpoint/2010/main" val="997993415"/>
+      </p:ext>
+    </p:extLst>
+  </p:cSld>
+  <p:clrMapOvr>
+    <a:masterClrMapping/>
+  </p:clrMapOvr>
+</p:notes>
+</file>
+
+<file path=ppt/notesSlides/notesSlide17.xml><?xml version="1.0" encoding="utf-8"?>
+<p:notes xmlns:a="http://schemas.openxmlformats.org/drawingml/2006/main" xmlns:r="http://schemas.openxmlformats.org/officeDocument/2006/relationships" xmlns:p="http://schemas.openxmlformats.org/presentationml/2006/main">
+  <p:cSld>
+    <p:spTree>
+      <p:nvGrpSpPr>
+        <p:cNvPr id="1" name=""/>
+        <p:cNvGrpSpPr/>
+        <p:nvPr/>
+      </p:nvGrpSpPr>
+      <p:grpSpPr>
+        <a:xfrm>
+          <a:off x="0" y="0"/>
+          <a:ext cx="0" cy="0"/>
+          <a:chOff x="0" y="0"/>
+          <a:chExt cx="0" cy="0"/>
+        </a:xfrm>
+      </p:grpSpPr>
+      <p:sp>
+        <p:nvSpPr>
+          <p:cNvPr id="2" name="Slide Image Placeholder 1"/>
+          <p:cNvSpPr>
+            <a:spLocks noGrp="1" noRot="1" noChangeAspect="1"/>
+          </p:cNvSpPr>
+          <p:nvPr>
+            <p:ph type="sldImg"/>
+          </p:nvPr>
+        </p:nvSpPr>
+        <p:spPr/>
+      </p:sp>
+      <p:sp>
+        <p:nvSpPr>
+          <p:cNvPr id="3" name="Notes Placeholder 2"/>
+          <p:cNvSpPr>
+            <a:spLocks noGrp="1"/>
+          </p:cNvSpPr>
+          <p:nvPr>
+            <p:ph type="body" idx="1"/>
+          </p:nvPr>
+        </p:nvSpPr>
+        <p:spPr/>
+        <p:txBody>
+          <a:bodyPr/>
+          <a:lstStyle/>
+          <a:p>
+            <a:r>
+              <a:rPr lang="en-US" dirty="0"/>
+              <a:t>Possible Activity:</a:t>
+            </a:r>
+          </a:p>
+          <a:p>
+            <a:r>
+              <a:rPr lang="en-US" dirty="0"/>
+              <a:t>Review the project code-base and identify 3-5 possible refactoring candidates.</a:t>
+            </a:r>
+            <a:br>
+              <a:rPr lang="en-US" dirty="0"/>
+            </a:br>
+            <a:r>
+              <a:rPr lang="en-US" dirty="0"/>
+              <a:t>Identify Technical Debt and circumstances under which </a:t>
+            </a:r>
+            <a:r>
+              <a:rPr lang="en-US"/>
+              <a:t>it accrued </a:t>
+            </a:r>
+            <a:r>
+              <a:rPr lang="en-US" dirty="0"/>
+              <a:t>interest</a:t>
+            </a:r>
+          </a:p>
+        </p:txBody>
+      </p:sp>
+    </p:spTree>
+    <p:extLst>
+      <p:ext uri="{BB962C8B-B14F-4D97-AF65-F5344CB8AC3E}">
+        <p14:creationId xmlns:p14="http://schemas.microsoft.com/office/powerpoint/2010/main" val="16350504"/>
       </p:ext>
     </p:extLst>
   </p:cSld>
@@ -1339,6 +1784,7 @@
           <a:lstStyle/>
           <a:p>
             <a:r>
+              <a:rPr dirty="0"/>
               <a:t>also in the book:</a:t>
             </a:r>
           </a:p>
@@ -1348,6 +1794,7 @@
               <a:buChar char="•"/>
             </a:pPr>
             <a:r>
+              <a:rPr dirty="0"/>
               <a:t>UML diagrams to illustrate the situation before and after</a:t>
             </a:r>
           </a:p>
@@ -1357,8 +1804,28 @@
               <a:buChar char="•"/>
             </a:pPr>
             <a:r>
+              <a:rPr dirty="0"/>
               <a:t>examples of code before and after each refactoring</a:t>
             </a:r>
+            <a:endParaRPr lang="en-US" dirty="0"/>
+          </a:p>
+          <a:p>
+            <a:pPr marL="228600" indent="-228600">
+              <a:buSzPct val="100000"/>
+              <a:buChar char="•"/>
+            </a:pPr>
+            <a:endParaRPr lang="en-US" dirty="0"/>
+          </a:p>
+          <a:p>
+            <a:pPr marL="228600" indent="-228600">
+              <a:buSzPct val="100000"/>
+              <a:buChar char="•"/>
+            </a:pPr>
+            <a:r>
+              <a:rPr lang="en-US" dirty="0"/>
+              <a:t>https://learning.oreilly.com/library/view/refactoring-improving-the/9780134757681/ </a:t>
+            </a:r>
+            <a:endParaRPr dirty="0"/>
           </a:p>
         </p:txBody>
       </p:sp>
@@ -2665,7 +3132,7 @@
           <a:p>
             <a:fld id="{5D2A64DE-480B-420F-9649-4F8E696E08E0}" type="datetime1">
               <a:rPr lang="en-US" smtClean="0"/>
-              <a:t>4/1/2022</a:t>
+              <a:t>4/2/2022</a:t>
             </a:fld>
             <a:endParaRPr lang="en-US"/>
           </a:p>
@@ -2917,7 +3384,7 @@
           <a:p>
             <a:fld id="{07C7BFD4-467E-4EDE-93EA-052F5B39A4E5}" type="datetime1">
               <a:rPr lang="en-US" smtClean="0"/>
-              <a:t>4/1/2022</a:t>
+              <a:t>4/2/2022</a:t>
             </a:fld>
             <a:endParaRPr lang="en-US"/>
           </a:p>
@@ -3231,7 +3698,7 @@
           <a:p>
             <a:fld id="{A533CBE2-D5BE-47AC-ADC2-9CDFC1D0CF90}" type="datetime1">
               <a:rPr lang="en-US" smtClean="0"/>
-              <a:t>4/1/2022</a:t>
+              <a:t>4/2/2022</a:t>
             </a:fld>
             <a:endParaRPr lang="en-US"/>
           </a:p>
@@ -3534,7 +4001,7 @@
           <a:p>
             <a:fld id="{39B7EDB1-CE74-4951-85A2-0B01C2128E28}" type="datetime1">
               <a:rPr lang="en-US" smtClean="0"/>
-              <a:t>4/1/2022</a:t>
+              <a:t>4/2/2022</a:t>
             </a:fld>
             <a:endParaRPr lang="en-US"/>
           </a:p>
@@ -3983,7 +4450,7 @@
           <a:p>
             <a:fld id="{2BC7EB92-A5C2-4807-A9DC-9EDE6CBFB241}" type="datetime1">
               <a:rPr lang="en-US" smtClean="0"/>
-              <a:t>4/1/2022</a:t>
+              <a:t>4/2/2022</a:t>
             </a:fld>
             <a:endParaRPr lang="en-US"/>
           </a:p>
@@ -4130,7 +4597,7 @@
           <a:p>
             <a:fld id="{109E55A0-C911-4F03-82FC-7E5926047D46}" type="datetime1">
               <a:rPr lang="en-US" smtClean="0"/>
-              <a:t>4/1/2022</a:t>
+              <a:t>4/2/2022</a:t>
             </a:fld>
             <a:endParaRPr lang="en-US"/>
           </a:p>
@@ -4467,7 +4934,7 @@
           <a:p>
             <a:fld id="{2B7B7EE0-7771-4CD5-9B2B-3550753A54A1}" type="datetime1">
               <a:rPr lang="en-US" smtClean="0"/>
-              <a:t>4/1/2022</a:t>
+              <a:t>4/2/2022</a:t>
             </a:fld>
             <a:endParaRPr lang="en-US"/>
           </a:p>
@@ -4778,7 +5245,7 @@
           <a:p>
             <a:fld id="{F8B318B3-0E87-4416-A9B8-D891968C2727}" type="datetime1">
               <a:rPr lang="en-US" smtClean="0"/>
-              <a:t>4/1/2022</a:t>
+              <a:t>4/2/2022</a:t>
             </a:fld>
             <a:endParaRPr lang="en-US"/>
           </a:p>
@@ -5069,7 +5536,7 @@
           <a:p>
             <a:fld id="{EA476A42-A091-4468-A075-64A31BE59948}" type="datetime1">
               <a:rPr lang="en-US" smtClean="0"/>
-              <a:t>4/1/2022</a:t>
+              <a:t>4/2/2022</a:t>
             </a:fld>
             <a:endParaRPr lang="en-US"/>
           </a:p>
@@ -5267,7 +5734,7 @@
           <a:p>
             <a:fld id="{0D3616D0-8311-4107-9726-6B805E7D05BA}" type="datetime1">
               <a:rPr lang="en-US" smtClean="0"/>
-              <a:t>4/1/2022</a:t>
+              <a:t>4/2/2022</a:t>
             </a:fld>
             <a:endParaRPr lang="en-US"/>
           </a:p>
@@ -5475,7 +5942,7 @@
           <a:p>
             <a:fld id="{3BC2557A-5C88-417A-A763-5AC779462A5F}" type="datetime1">
               <a:rPr lang="en-US" smtClean="0"/>
-              <a:t>4/1/2022</a:t>
+              <a:t>4/2/2022</a:t>
             </a:fld>
             <a:endParaRPr lang="en-US"/>
           </a:p>
@@ -7146,7 +7613,7 @@
           </a:ln>
           <a:extLst>
             <a:ext uri="{C572A759-6A51-4108-AA02-DFA0A04FC94B}">
-              <ma14:wrappingTextBoxFlag xmlns="" xmlns:m="http://schemas.openxmlformats.org/officeDocument/2006/math" xmlns:a14="http://schemas.microsoft.com/office/drawing/2010/main" xmlns:ma14="http://schemas.microsoft.com/office/mac/drawingml/2011/main" val="1"/>
+              <ma14:wrappingTextBoxFlag xmlns:ma14="http://schemas.microsoft.com/office/mac/drawingml/2011/main" xmlns:a14="http://schemas.microsoft.com/office/drawing/2010/main" xmlns:m="http://schemas.openxmlformats.org/officeDocument/2006/math" xmlns="" val="1"/>
             </a:ext>
           </a:extLst>
         </p:spPr>
@@ -7185,7 +7652,7 @@
           </a:ln>
           <a:extLst>
             <a:ext uri="{C572A759-6A51-4108-AA02-DFA0A04FC94B}">
-              <ma14:wrappingTextBoxFlag xmlns="" xmlns:m="http://schemas.openxmlformats.org/officeDocument/2006/math" xmlns:a14="http://schemas.microsoft.com/office/drawing/2010/main" xmlns:ma14="http://schemas.microsoft.com/office/mac/drawingml/2011/main" val="1"/>
+              <ma14:wrappingTextBoxFlag xmlns:ma14="http://schemas.microsoft.com/office/mac/drawingml/2011/main" xmlns:a14="http://schemas.microsoft.com/office/drawing/2010/main" xmlns:m="http://schemas.openxmlformats.org/officeDocument/2006/math" xmlns="" val="1"/>
             </a:ext>
           </a:extLst>
         </p:spPr>
@@ -8162,7 +8629,7 @@
           <a:p>
             <a:fld id="{54D997E8-DDEE-43F1-8D9B-F8A1E11DE488}" type="datetime1">
               <a:rPr lang="en-US" smtClean="0"/>
-              <a:t>4/1/2022</a:t>
+              <a:t>4/2/2022</a:t>
             </a:fld>
             <a:endParaRPr lang="en-US"/>
           </a:p>
@@ -8701,7 +9168,7 @@
           </a:ln>
           <a:extLst>
             <a:ext uri="{C572A759-6A51-4108-AA02-DFA0A04FC94B}">
-              <ma14:wrappingTextBoxFlag xmlns="" xmlns:m="http://schemas.openxmlformats.org/officeDocument/2006/math" xmlns:a14="http://schemas.microsoft.com/office/drawing/2010/main" xmlns:ma14="http://schemas.microsoft.com/office/mac/drawingml/2011/main" val="1"/>
+              <ma14:wrappingTextBoxFlag xmlns:ma14="http://schemas.microsoft.com/office/mac/drawingml/2011/main" xmlns:a14="http://schemas.microsoft.com/office/drawing/2010/main" xmlns:m="http://schemas.openxmlformats.org/officeDocument/2006/math" xmlns="" val="1"/>
             </a:ext>
           </a:extLst>
         </p:spPr>
@@ -9086,7 +9553,7 @@
           </a:prstGeom>
           <a:extLst>
             <a:ext uri="{C572A759-6A51-4108-AA02-DFA0A04FC94B}">
-              <ma14:wrappingTextBoxFlag xmlns="" xmlns:m="http://schemas.openxmlformats.org/officeDocument/2006/math" xmlns:a14="http://schemas.microsoft.com/office/drawing/2010/main" xmlns:ma14="http://schemas.microsoft.com/office/mac/drawingml/2011/main" val="1"/>
+              <ma14:wrappingTextBoxFlag xmlns:ma14="http://schemas.microsoft.com/office/mac/drawingml/2011/main" xmlns:a14="http://schemas.microsoft.com/office/drawing/2010/main" xmlns:m="http://schemas.openxmlformats.org/officeDocument/2006/math" xmlns="" val="1"/>
             </a:ext>
           </a:extLst>
         </p:spPr>
@@ -9252,7 +9719,7 @@
           </a:prstGeom>
           <a:extLst>
             <a:ext uri="{C572A759-6A51-4108-AA02-DFA0A04FC94B}">
-              <ma14:wrappingTextBoxFlag xmlns="" xmlns:m="http://schemas.openxmlformats.org/officeDocument/2006/math" xmlns:a14="http://schemas.microsoft.com/office/drawing/2010/main" xmlns:ma14="http://schemas.microsoft.com/office/mac/drawingml/2011/main" val="1"/>
+              <ma14:wrappingTextBoxFlag xmlns:ma14="http://schemas.microsoft.com/office/mac/drawingml/2011/main" xmlns:a14="http://schemas.microsoft.com/office/drawing/2010/main" xmlns:m="http://schemas.openxmlformats.org/officeDocument/2006/math" xmlns="" val="1"/>
             </a:ext>
           </a:extLst>
         </p:spPr>
@@ -9287,7 +9754,7 @@
           </a:ln>
           <a:extLst>
             <a:ext uri="{C572A759-6A51-4108-AA02-DFA0A04FC94B}">
-              <ma14:wrappingTextBoxFlag xmlns="" xmlns:m="http://schemas.openxmlformats.org/officeDocument/2006/math" xmlns:a14="http://schemas.microsoft.com/office/drawing/2010/main" xmlns:ma14="http://schemas.microsoft.com/office/mac/drawingml/2011/main" val="1"/>
+              <ma14:wrappingTextBoxFlag xmlns:ma14="http://schemas.microsoft.com/office/mac/drawingml/2011/main" xmlns:a14="http://schemas.microsoft.com/office/drawing/2010/main" xmlns:m="http://schemas.openxmlformats.org/officeDocument/2006/math" xmlns="" val="1"/>
             </a:ext>
           </a:extLst>
         </p:spPr>
@@ -9352,7 +9819,7 @@
           </a:ln>
           <a:extLst>
             <a:ext uri="{C572A759-6A51-4108-AA02-DFA0A04FC94B}">
-              <ma14:wrappingTextBoxFlag xmlns="" xmlns:m="http://schemas.openxmlformats.org/officeDocument/2006/math" xmlns:a14="http://schemas.microsoft.com/office/drawing/2010/main" xmlns:ma14="http://schemas.microsoft.com/office/mac/drawingml/2011/main" val="1"/>
+              <ma14:wrappingTextBoxFlag xmlns:ma14="http://schemas.microsoft.com/office/mac/drawingml/2011/main" xmlns:a14="http://schemas.microsoft.com/office/drawing/2010/main" xmlns:m="http://schemas.openxmlformats.org/officeDocument/2006/math" xmlns="" val="1"/>
             </a:ext>
           </a:extLst>
         </p:spPr>
@@ -9439,7 +9906,7 @@
           </a:prstGeom>
           <a:extLst>
             <a:ext uri="{C572A759-6A51-4108-AA02-DFA0A04FC94B}">
-              <ma14:wrappingTextBoxFlag xmlns="" xmlns:m="http://schemas.openxmlformats.org/officeDocument/2006/math" xmlns:a14="http://schemas.microsoft.com/office/drawing/2010/main" xmlns:ma14="http://schemas.microsoft.com/office/mac/drawingml/2011/main" val="1"/>
+              <ma14:wrappingTextBoxFlag xmlns:ma14="http://schemas.microsoft.com/office/mac/drawingml/2011/main" xmlns:a14="http://schemas.microsoft.com/office/drawing/2010/main" xmlns:m="http://schemas.openxmlformats.org/officeDocument/2006/math" xmlns="" val="1"/>
             </a:ext>
           </a:extLst>
         </p:spPr>
@@ -9474,7 +9941,7 @@
           </a:ln>
           <a:extLst>
             <a:ext uri="{C572A759-6A51-4108-AA02-DFA0A04FC94B}">
-              <ma14:wrappingTextBoxFlag xmlns="" xmlns:m="http://schemas.openxmlformats.org/officeDocument/2006/math" xmlns:a14="http://schemas.microsoft.com/office/drawing/2010/main" xmlns:ma14="http://schemas.microsoft.com/office/mac/drawingml/2011/main" val="1"/>
+              <ma14:wrappingTextBoxFlag xmlns:ma14="http://schemas.microsoft.com/office/mac/drawingml/2011/main" xmlns:a14="http://schemas.microsoft.com/office/drawing/2010/main" xmlns:m="http://schemas.openxmlformats.org/officeDocument/2006/math" xmlns="" val="1"/>
             </a:ext>
           </a:extLst>
         </p:spPr>
@@ -9539,7 +10006,7 @@
           </a:ln>
           <a:extLst>
             <a:ext uri="{C572A759-6A51-4108-AA02-DFA0A04FC94B}">
-              <ma14:wrappingTextBoxFlag xmlns="" xmlns:m="http://schemas.openxmlformats.org/officeDocument/2006/math" xmlns:a14="http://schemas.microsoft.com/office/drawing/2010/main" xmlns:ma14="http://schemas.microsoft.com/office/mac/drawingml/2011/main" val="1"/>
+              <ma14:wrappingTextBoxFlag xmlns:ma14="http://schemas.microsoft.com/office/mac/drawingml/2011/main" xmlns:a14="http://schemas.microsoft.com/office/drawing/2010/main" xmlns:m="http://schemas.openxmlformats.org/officeDocument/2006/math" xmlns="" val="1"/>
             </a:ext>
           </a:extLst>
         </p:spPr>
@@ -9626,7 +10093,7 @@
           </a:prstGeom>
           <a:extLst>
             <a:ext uri="{C572A759-6A51-4108-AA02-DFA0A04FC94B}">
-              <ma14:wrappingTextBoxFlag xmlns="" xmlns:m="http://schemas.openxmlformats.org/officeDocument/2006/math" xmlns:a14="http://schemas.microsoft.com/office/drawing/2010/main" xmlns:ma14="http://schemas.microsoft.com/office/mac/drawingml/2011/main" val="1"/>
+              <ma14:wrappingTextBoxFlag xmlns:ma14="http://schemas.microsoft.com/office/mac/drawingml/2011/main" xmlns:a14="http://schemas.microsoft.com/office/drawing/2010/main" xmlns:m="http://schemas.openxmlformats.org/officeDocument/2006/math" xmlns="" val="1"/>
             </a:ext>
           </a:extLst>
         </p:spPr>
@@ -10064,7 +10531,7 @@
           </a:ln>
           <a:extLst>
             <a:ext uri="{C572A759-6A51-4108-AA02-DFA0A04FC94B}">
-              <ma14:wrappingTextBoxFlag xmlns="" xmlns:m="http://schemas.openxmlformats.org/officeDocument/2006/math" xmlns:a14="http://schemas.microsoft.com/office/drawing/2010/main" xmlns:ma14="http://schemas.microsoft.com/office/mac/drawingml/2011/main" val="1"/>
+              <ma14:wrappingTextBoxFlag xmlns:ma14="http://schemas.microsoft.com/office/mac/drawingml/2011/main" xmlns:a14="http://schemas.microsoft.com/office/drawing/2010/main" xmlns:m="http://schemas.openxmlformats.org/officeDocument/2006/math" xmlns="" val="1"/>
             </a:ext>
           </a:extLst>
         </p:spPr>
@@ -10099,7 +10566,7 @@
           </a:ln>
           <a:extLst>
             <a:ext uri="{C572A759-6A51-4108-AA02-DFA0A04FC94B}">
-              <ma14:wrappingTextBoxFlag xmlns="" xmlns:m="http://schemas.openxmlformats.org/officeDocument/2006/math" xmlns:a14="http://schemas.microsoft.com/office/drawing/2010/main" xmlns:ma14="http://schemas.microsoft.com/office/mac/drawingml/2011/main" val="1"/>
+              <ma14:wrappingTextBoxFlag xmlns:ma14="http://schemas.microsoft.com/office/mac/drawingml/2011/main" xmlns:a14="http://schemas.microsoft.com/office/drawing/2010/main" xmlns:m="http://schemas.openxmlformats.org/officeDocument/2006/math" xmlns="" val="1"/>
             </a:ext>
           </a:extLst>
         </p:spPr>
@@ -12141,8 +12608,291 @@
           </p:nvPr>
         </p:nvSpPr>
         <p:spPr>
+          <a:prstGeom prst="rect">
+            <a:avLst/>
+          </a:prstGeom>
+        </p:spPr>
+        <p:txBody>
+          <a:bodyPr/>
+          <a:lstStyle>
+            <a:lvl1pPr defTabSz="1369804">
+              <a:defRPr sz="4740" spc="-94"/>
+            </a:lvl1pPr>
+          </a:lstStyle>
+          <a:p>
+            <a:r>
+              <a:rPr lang="en-US" dirty="0"/>
+              <a:t>This leads us into Technical Debt</a:t>
+            </a:r>
+            <a:endParaRPr dirty="0"/>
+          </a:p>
+        </p:txBody>
+      </p:sp>
+      <p:sp>
+        <p:nvSpPr>
+          <p:cNvPr id="232" name="Slide Subtitle"/>
+          <p:cNvSpPr txBox="1">
+            <a:spLocks noGrp="1"/>
+          </p:cNvSpPr>
+          <p:nvPr>
+            <p:ph type="body" idx="21"/>
+          </p:nvPr>
+        </p:nvSpPr>
+        <p:spPr>
+          <a:prstGeom prst="rect">
+            <a:avLst/>
+          </a:prstGeom>
+        </p:spPr>
+        <p:txBody>
+          <a:bodyPr>
+            <a:normAutofit lnSpcReduction="10000"/>
+          </a:bodyPr>
+          <a:lstStyle/>
+          <a:p>
+            <a:endParaRPr/>
+          </a:p>
+        </p:txBody>
+      </p:sp>
+      <p:sp>
+        <p:nvSpPr>
+          <p:cNvPr id="233" name="Developer time is valuable: is this the best use of time today?…"/>
+          <p:cNvSpPr txBox="1">
+            <a:spLocks noGrp="1"/>
+          </p:cNvSpPr>
+          <p:nvPr>
+            <p:ph type="body" idx="1"/>
+          </p:nvPr>
+        </p:nvSpPr>
+        <p:spPr>
+          <a:prstGeom prst="rect">
+            <a:avLst/>
+          </a:prstGeom>
+        </p:spPr>
+        <p:txBody>
+          <a:bodyPr>
+            <a:normAutofit/>
+          </a:bodyPr>
+          <a:lstStyle/>
+          <a:p>
+            <a:r>
+              <a:rPr lang="en-US" dirty="0"/>
+              <a:t>Code smells and Refactoring are tightly coupled with Technical debt</a:t>
+            </a:r>
+          </a:p>
+          <a:p>
+            <a:r>
+              <a:rPr lang="en-US" dirty="0"/>
+              <a:t>In software-intensive systems, technical debt consists of </a:t>
+            </a:r>
+            <a:r>
+              <a:rPr lang="en-US" i="1" dirty="0"/>
+              <a:t>design or implementation </a:t>
+            </a:r>
+            <a:r>
+              <a:rPr lang="en-US" dirty="0"/>
+              <a:t>constructs that are expedient in the short term but that set up a technical context that can make a </a:t>
+            </a:r>
+            <a:r>
+              <a:rPr lang="en-US" i="1" dirty="0"/>
+              <a:t>future change</a:t>
+            </a:r>
+            <a:r>
+              <a:rPr lang="en-US" dirty="0"/>
+              <a:t> more costly or impossible. </a:t>
+            </a:r>
+          </a:p>
+        </p:txBody>
+      </p:sp>
+    </p:spTree>
+    <p:extLst>
+      <p:ext uri="{BB962C8B-B14F-4D97-AF65-F5344CB8AC3E}">
+        <p14:creationId xmlns:p14="http://schemas.microsoft.com/office/powerpoint/2010/main" val="3889615162"/>
+      </p:ext>
+    </p:extLst>
+  </p:cSld>
+  <p:clrMapOvr>
+    <a:masterClrMapping/>
+  </p:clrMapOvr>
+  <p:transition spd="med"/>
+</p:sld>
+</file>
+
+<file path=ppt/slides/slide2.xml><?xml version="1.0" encoding="utf-8"?>
+<p:sld xmlns:a="http://schemas.openxmlformats.org/drawingml/2006/main" xmlns:r="http://schemas.openxmlformats.org/officeDocument/2006/relationships" xmlns:p="http://schemas.openxmlformats.org/presentationml/2006/main">
+  <p:cSld>
+    <p:spTree>
+      <p:nvGrpSpPr>
+        <p:cNvPr id="1" name=""/>
+        <p:cNvGrpSpPr/>
+        <p:nvPr/>
+      </p:nvGrpSpPr>
+      <p:grpSpPr>
+        <a:xfrm>
+          <a:off x="0" y="0"/>
+          <a:ext cx="0" cy="0"/>
+          <a:chOff x="0" y="0"/>
+          <a:chExt cx="0" cy="0"/>
+        </a:xfrm>
+      </p:grpSpPr>
+      <p:sp>
+        <p:nvSpPr>
+          <p:cNvPr id="138" name="Learning Goals"/>
+          <p:cNvSpPr txBox="1">
+            <a:spLocks noGrp="1"/>
+          </p:cNvSpPr>
+          <p:nvPr>
+            <p:ph type="title"/>
+          </p:nvPr>
+        </p:nvSpPr>
+        <p:spPr>
+          <a:prstGeom prst="rect">
+            <a:avLst/>
+          </a:prstGeom>
+        </p:spPr>
+        <p:txBody>
+          <a:bodyPr/>
+          <a:lstStyle>
+            <a:lvl1pPr defTabSz="1369804">
+              <a:defRPr sz="4740" spc="-94"/>
+            </a:lvl1pPr>
+          </a:lstStyle>
+          <a:p>
+            <a:r>
+              <a:t>Learning Goals</a:t>
+            </a:r>
+          </a:p>
+        </p:txBody>
+      </p:sp>
+      <p:sp>
+        <p:nvSpPr>
+          <p:cNvPr id="139" name="By the end of this lesson, you should be able to…"/>
+          <p:cNvSpPr txBox="1">
+            <a:spLocks noGrp="1"/>
+          </p:cNvSpPr>
+          <p:nvPr>
+            <p:ph type="body" idx="21"/>
+          </p:nvPr>
+        </p:nvSpPr>
+        <p:spPr>
+          <a:prstGeom prst="rect">
+            <a:avLst/>
+          </a:prstGeom>
+          <a:extLst>
+            <a:ext uri="{C572A759-6A51-4108-AA02-DFA0A04FC94B}">
+              <ma14:wrappingTextBoxFlag xmlns:ma14="http://schemas.microsoft.com/office/mac/drawingml/2011/main" xmlns:a14="http://schemas.microsoft.com/office/drawing/2010/main" xmlns:m="http://schemas.openxmlformats.org/officeDocument/2006/math" xmlns="" val="1"/>
+            </a:ext>
+          </a:extLst>
+        </p:spPr>
+        <p:txBody>
+          <a:bodyPr>
+            <a:normAutofit lnSpcReduction="10000"/>
+          </a:bodyPr>
+          <a:lstStyle>
+            <a:lvl1pPr>
+              <a:defRPr>
+                <a:solidFill>
+                  <a:srgbClr val="005493"/>
+                </a:solidFill>
+              </a:defRPr>
+            </a:lvl1pPr>
+          </a:lstStyle>
+          <a:p>
+            <a:r>
+              <a:rPr dirty="0"/>
+              <a:t>By the end of this lesson, you should be able to…</a:t>
+            </a:r>
+          </a:p>
+        </p:txBody>
+      </p:sp>
+      <p:sp>
+        <p:nvSpPr>
+          <p:cNvPr id="140" name="Apply refactoring techniques to improve code quality…"/>
+          <p:cNvSpPr txBox="1">
+            <a:spLocks noGrp="1"/>
+          </p:cNvSpPr>
+          <p:nvPr>
+            <p:ph type="body" idx="1"/>
+          </p:nvPr>
+        </p:nvSpPr>
+        <p:spPr>
+          <a:prstGeom prst="rect">
+            <a:avLst/>
+          </a:prstGeom>
+        </p:spPr>
+        <p:txBody>
+          <a:bodyPr/>
+          <a:lstStyle/>
+          <a:p>
+            <a:pPr marL="514350" indent="-514350">
+              <a:buFont typeface="+mj-lt"/>
+              <a:buAutoNum type="arabicPeriod"/>
+            </a:pPr>
+            <a:r>
+              <a:rPr lang="en-US" dirty="0"/>
+              <a:t>Some common code “smells” (anti-patterns).</a:t>
+            </a:r>
+          </a:p>
+          <a:p>
+            <a:pPr marL="514350" indent="-514350">
+              <a:buFont typeface="+mj-lt"/>
+              <a:buAutoNum type="arabicPeriod"/>
+            </a:pPr>
+            <a:r>
+              <a:rPr lang="en-US" dirty="0"/>
+              <a:t>“Refactoring”: restructuring of code to improve structure.</a:t>
+            </a:r>
+          </a:p>
+          <a:p>
+            <a:pPr marL="514350" indent="-514350">
+              <a:buFont typeface="+mj-lt"/>
+              <a:buAutoNum type="arabicPeriod"/>
+            </a:pPr>
+            <a:r>
+              <a:rPr lang="en-US" dirty="0"/>
+              <a:t>“Technical Debt”: generalization covering all internal problems in a code-base.</a:t>
+            </a:r>
+          </a:p>
+        </p:txBody>
+      </p:sp>
+    </p:spTree>
+  </p:cSld>
+  <p:clrMapOvr>
+    <a:masterClrMapping/>
+  </p:clrMapOvr>
+  <p:transition spd="med"/>
+</p:sld>
+</file>
+
+<file path=ppt/slides/slide20.xml><?xml version="1.0" encoding="utf-8"?>
+<p:sld xmlns:a="http://schemas.openxmlformats.org/drawingml/2006/main" xmlns:r="http://schemas.openxmlformats.org/officeDocument/2006/relationships" xmlns:p="http://schemas.openxmlformats.org/presentationml/2006/main">
+  <p:cSld>
+    <p:spTree>
+      <p:nvGrpSpPr>
+        <p:cNvPr id="1" name=""/>
+        <p:cNvGrpSpPr/>
+        <p:nvPr/>
+      </p:nvGrpSpPr>
+      <p:grpSpPr>
+        <a:xfrm>
+          <a:off x="0" y="0"/>
+          <a:ext cx="0" cy="0"/>
+          <a:chOff x="0" y="0"/>
+          <a:chExt cx="0" cy="0"/>
+        </a:xfrm>
+      </p:grpSpPr>
+      <p:sp>
+        <p:nvSpPr>
+          <p:cNvPr id="231" name="Refactoring Risks"/>
+          <p:cNvSpPr txBox="1">
+            <a:spLocks noGrp="1"/>
+          </p:cNvSpPr>
+          <p:nvPr>
+            <p:ph type="title"/>
+          </p:nvPr>
+        </p:nvSpPr>
+        <p:spPr>
           <a:xfrm>
-            <a:off x="643466" y="1186771"/>
+            <a:off x="643466" y="759868"/>
             <a:ext cx="11717868" cy="1372516"/>
           </a:xfrm>
           <a:prstGeom prst="rect">
@@ -12161,7 +12911,7 @@
           <a:p>
             <a:r>
               <a:rPr lang="en-US" sz="4400" dirty="0"/>
-              <a:t>Technical Debt is Sum of Internal Problems in Project Codebase</a:t>
+              <a:t>Technical Debt is Internal but affects maintainability and evolvability</a:t>
             </a:r>
             <a:endParaRPr sz="4400" dirty="0"/>
           </a:p>
@@ -12179,8 +12929,8 @@
         </p:nvSpPr>
         <p:spPr>
           <a:xfrm>
-            <a:off x="643466" y="3485069"/>
-            <a:ext cx="6000191" cy="4403207"/>
+            <a:off x="643466" y="4441947"/>
+            <a:ext cx="6267687" cy="3751644"/>
           </a:xfrm>
           <a:prstGeom prst="rect">
             <a:avLst/>
@@ -12188,7 +12938,7 @@
         </p:spPr>
         <p:txBody>
           <a:bodyPr>
-            <a:normAutofit fontScale="92500" lnSpcReduction="20000"/>
+            <a:normAutofit/>
           </a:bodyPr>
           <a:lstStyle/>
           <a:p>
@@ -12198,74 +12948,63 @@
               </a:spcBef>
             </a:pPr>
             <a:r>
-              <a:rPr lang="en-US" dirty="0"/>
-              <a:t>Internal because they don’t show as user-visible failures.</a:t>
-            </a:r>
-          </a:p>
-          <a:p>
-            <a:pPr>
+              <a:rPr lang="en-US" sz="3200" dirty="0"/>
+              <a:t>Usual Scenarios:</a:t>
+            </a:r>
+          </a:p>
+          <a:p>
+            <a:pPr lvl="1">
               <a:spcBef>
                 <a:spcPts val="1200"/>
               </a:spcBef>
             </a:pPr>
             <a:r>
-              <a:rPr lang="en-US" dirty="0"/>
-              <a:t>Examples:</a:t>
-            </a:r>
-          </a:p>
-          <a:p>
-            <a:pPr>
+              <a:rPr lang="en-US" sz="3200" dirty="0"/>
+              <a:t>Quick-and-Dirty if-then-else;</a:t>
+            </a:r>
+          </a:p>
+          <a:p>
+            <a:pPr lvl="1">
               <a:spcBef>
                 <a:spcPts val="1200"/>
               </a:spcBef>
             </a:pPr>
             <a:r>
-              <a:rPr lang="en-US" dirty="0"/>
-              <a:t>Code Smells;</a:t>
-            </a:r>
-          </a:p>
-          <a:p>
-            <a:pPr>
+              <a:rPr lang="en-US" sz="3200" dirty="0"/>
+              <a:t>Hitting the Wall;</a:t>
+            </a:r>
+          </a:p>
+          <a:p>
+            <a:pPr lvl="1">
               <a:spcBef>
                 <a:spcPts val="1200"/>
               </a:spcBef>
             </a:pPr>
             <a:r>
-              <a:rPr lang="en-US" dirty="0"/>
-              <a:t>Missing tests;</a:t>
-            </a:r>
-          </a:p>
-          <a:p>
-            <a:pPr>
+              <a:rPr lang="en-US" sz="3200" dirty="0"/>
+              <a:t>Crumbling Under the Load;</a:t>
+            </a:r>
+          </a:p>
+          <a:p>
+            <a:pPr lvl="1">
               <a:spcBef>
                 <a:spcPts val="1200"/>
               </a:spcBef>
             </a:pPr>
             <a:r>
-              <a:rPr lang="en-US" dirty="0"/>
-              <a:t>Missing documentation;</a:t>
-            </a:r>
-          </a:p>
-          <a:p>
-            <a:pPr>
+              <a:rPr lang="en-US" sz="3200" dirty="0"/>
+              <a:t>Death by a Thousand Cuts;</a:t>
+            </a:r>
+          </a:p>
+          <a:p>
+            <a:pPr lvl="1">
               <a:spcBef>
                 <a:spcPts val="1200"/>
               </a:spcBef>
             </a:pPr>
             <a:r>
-              <a:rPr lang="en-US" dirty="0"/>
-              <a:t>Dependency on old versions of third-party systems;</a:t>
-            </a:r>
-          </a:p>
-          <a:p>
-            <a:pPr>
-              <a:spcBef>
-                <a:spcPts val="1200"/>
-              </a:spcBef>
-            </a:pPr>
-            <a:r>
-              <a:rPr lang="en-US" dirty="0"/>
-              <a:t>Inefficient and/or non-scalable algorithms.</a:t>
+              <a:rPr lang="en-US" sz="3200" dirty="0"/>
+              <a:t>Tactical Investment.</a:t>
             </a:r>
           </a:p>
         </p:txBody>
@@ -12301,7 +13040,7 @@
         </p:blipFill>
         <p:spPr bwMode="auto">
           <a:xfrm>
-            <a:off x="6643657" y="3485069"/>
+            <a:off x="6752145" y="3540636"/>
             <a:ext cx="5492813" cy="4641427"/>
           </a:xfrm>
           <a:prstGeom prst="rect">
@@ -12326,7 +13065,7 @@
         </p:nvSpPr>
         <p:spPr>
           <a:xfrm>
-            <a:off x="3500438" y="8080542"/>
+            <a:off x="4240331" y="8286942"/>
             <a:ext cx="2511814" cy="486287"/>
           </a:xfrm>
           <a:prstGeom prst="rect">
@@ -12375,6 +13114,286 @@
                 <a:latin typeface="Ink Free" panose="03080402000500000000" pitchFamily="66" charset="0"/>
               </a:rPr>
               <a:t>Not just code!</a:t>
+            </a:r>
+          </a:p>
+        </p:txBody>
+      </p:sp>
+      <p:sp>
+        <p:nvSpPr>
+          <p:cNvPr id="7" name="Developer time is valuable: is this the best use of time today?…">
+            <a:extLst>
+              <a:ext uri="{FF2B5EF4-FFF2-40B4-BE49-F238E27FC236}">
+                <a16:creationId xmlns:a16="http://schemas.microsoft.com/office/drawing/2014/main" id="{84421804-5DE3-46F0-8759-4CE204964E4D}"/>
+              </a:ext>
+            </a:extLst>
+          </p:cNvPr>
+          <p:cNvSpPr txBox="1">
+            <a:spLocks/>
+          </p:cNvSpPr>
+          <p:nvPr/>
+        </p:nvSpPr>
+        <p:spPr>
+          <a:xfrm>
+            <a:off x="643466" y="2400188"/>
+            <a:ext cx="11717868" cy="1691366"/>
+          </a:xfrm>
+          <a:prstGeom prst="rect">
+            <a:avLst/>
+          </a:prstGeom>
+          <a:ln w="3175">
+            <a:miter lim="400000"/>
+          </a:ln>
+          <a:extLst>
+            <a:ext uri="{C572A759-6A51-4108-AA02-DFA0A04FC94B}">
+              <ma14:wrappingTextBoxFlag xmlns:ma14="http://schemas.microsoft.com/office/mac/drawingml/2011/main" xmlns:a14="http://schemas.microsoft.com/office/drawing/2010/main" xmlns:m="http://schemas.openxmlformats.org/officeDocument/2006/math" xmlns="" val="1"/>
+            </a:ext>
+          </a:extLst>
+        </p:spPr>
+        <p:txBody>
+          <a:bodyPr lIns="27093" tIns="27093" rIns="27093" bIns="27093">
+            <a:normAutofit/>
+          </a:bodyPr>
+          <a:lstStyle>
+            <a:lvl1pPr marL="431800" marR="0" indent="-431800" algn="l" defTabSz="1733930" rtl="0" latinLnBrk="0">
+              <a:lnSpc>
+                <a:spcPct val="90000"/>
+              </a:lnSpc>
+              <a:spcBef>
+                <a:spcPts val="3200"/>
+              </a:spcBef>
+              <a:spcAft>
+                <a:spcPts val="0"/>
+              </a:spcAft>
+              <a:buClrTx/>
+              <a:buSzPct val="123000"/>
+              <a:buFontTx/>
+              <a:buChar char="•"/>
+              <a:tabLst/>
+              <a:defRPr sz="3400" b="0" i="0" u="none" strike="noStrike" cap="none" spc="0" baseline="0">
+                <a:solidFill>
+                  <a:srgbClr val="000000"/>
+                </a:solidFill>
+                <a:uFillTx/>
+                <a:latin typeface="+mn-lt"/>
+                <a:ea typeface="+mn-ea"/>
+                <a:cs typeface="+mn-cs"/>
+                <a:sym typeface="Helvetica Neue"/>
+              </a:defRPr>
+            </a:lvl1pPr>
+            <a:lvl2pPr marL="1041400" marR="0" indent="-431800" algn="l" defTabSz="1733930" rtl="0" latinLnBrk="0">
+              <a:lnSpc>
+                <a:spcPct val="90000"/>
+              </a:lnSpc>
+              <a:spcBef>
+                <a:spcPts val="3200"/>
+              </a:spcBef>
+              <a:spcAft>
+                <a:spcPts val="0"/>
+              </a:spcAft>
+              <a:buClrTx/>
+              <a:buSzPct val="123000"/>
+              <a:buFontTx/>
+              <a:buChar char="•"/>
+              <a:tabLst/>
+              <a:defRPr sz="3400" b="0" i="0" u="none" strike="noStrike" cap="none" spc="0" baseline="0">
+                <a:solidFill>
+                  <a:srgbClr val="000000"/>
+                </a:solidFill>
+                <a:uFillTx/>
+                <a:latin typeface="+mn-lt"/>
+                <a:ea typeface="+mn-ea"/>
+                <a:cs typeface="+mn-cs"/>
+                <a:sym typeface="Helvetica Neue"/>
+              </a:defRPr>
+            </a:lvl2pPr>
+            <a:lvl3pPr marL="1651000" marR="0" indent="-431800" algn="l" defTabSz="1733930" rtl="0" latinLnBrk="0">
+              <a:lnSpc>
+                <a:spcPct val="90000"/>
+              </a:lnSpc>
+              <a:spcBef>
+                <a:spcPts val="3200"/>
+              </a:spcBef>
+              <a:spcAft>
+                <a:spcPts val="0"/>
+              </a:spcAft>
+              <a:buClrTx/>
+              <a:buSzPct val="123000"/>
+              <a:buFontTx/>
+              <a:buChar char="•"/>
+              <a:tabLst/>
+              <a:defRPr sz="3400" b="0" i="0" u="none" strike="noStrike" cap="none" spc="0" baseline="0">
+                <a:solidFill>
+                  <a:srgbClr val="000000"/>
+                </a:solidFill>
+                <a:uFillTx/>
+                <a:latin typeface="+mn-lt"/>
+                <a:ea typeface="+mn-ea"/>
+                <a:cs typeface="+mn-cs"/>
+                <a:sym typeface="Helvetica Neue"/>
+              </a:defRPr>
+            </a:lvl3pPr>
+            <a:lvl4pPr marL="2260600" marR="0" indent="-431800" algn="l" defTabSz="1733930" rtl="0" latinLnBrk="0">
+              <a:lnSpc>
+                <a:spcPct val="90000"/>
+              </a:lnSpc>
+              <a:spcBef>
+                <a:spcPts val="3200"/>
+              </a:spcBef>
+              <a:spcAft>
+                <a:spcPts val="0"/>
+              </a:spcAft>
+              <a:buClrTx/>
+              <a:buSzPct val="123000"/>
+              <a:buFontTx/>
+              <a:buChar char="•"/>
+              <a:tabLst/>
+              <a:defRPr sz="3400" b="0" i="0" u="none" strike="noStrike" cap="none" spc="0" baseline="0">
+                <a:solidFill>
+                  <a:srgbClr val="000000"/>
+                </a:solidFill>
+                <a:uFillTx/>
+                <a:latin typeface="+mn-lt"/>
+                <a:ea typeface="+mn-ea"/>
+                <a:cs typeface="+mn-cs"/>
+                <a:sym typeface="Helvetica Neue"/>
+              </a:defRPr>
+            </a:lvl4pPr>
+            <a:lvl5pPr marL="2870200" marR="0" indent="-431800" algn="l" defTabSz="1733930" rtl="0" latinLnBrk="0">
+              <a:lnSpc>
+                <a:spcPct val="90000"/>
+              </a:lnSpc>
+              <a:spcBef>
+                <a:spcPts val="3200"/>
+              </a:spcBef>
+              <a:spcAft>
+                <a:spcPts val="0"/>
+              </a:spcAft>
+              <a:buClrTx/>
+              <a:buSzPct val="123000"/>
+              <a:buFontTx/>
+              <a:buChar char="•"/>
+              <a:tabLst/>
+              <a:defRPr sz="3400" b="0" i="0" u="none" strike="noStrike" cap="none" spc="0" baseline="0">
+                <a:solidFill>
+                  <a:srgbClr val="000000"/>
+                </a:solidFill>
+                <a:uFillTx/>
+                <a:latin typeface="+mn-lt"/>
+                <a:ea typeface="+mn-ea"/>
+                <a:cs typeface="+mn-cs"/>
+                <a:sym typeface="Helvetica Neue"/>
+              </a:defRPr>
+            </a:lvl5pPr>
+            <a:lvl6pPr marL="0" marR="0" indent="2286000" algn="l" defTabSz="587022" rtl="0" latinLnBrk="0">
+              <a:lnSpc>
+                <a:spcPct val="100000"/>
+              </a:lnSpc>
+              <a:spcBef>
+                <a:spcPts val="0"/>
+              </a:spcBef>
+              <a:spcAft>
+                <a:spcPts val="0"/>
+              </a:spcAft>
+              <a:buClrTx/>
+              <a:buSzTx/>
+              <a:buFontTx/>
+              <a:buNone/>
+              <a:tabLst/>
+              <a:defRPr sz="3800" b="1" i="0" u="none" strike="noStrike" cap="none" spc="0" baseline="0">
+                <a:solidFill>
+                  <a:srgbClr val="000000"/>
+                </a:solidFill>
+                <a:uFillTx/>
+                <a:latin typeface="+mn-lt"/>
+                <a:ea typeface="+mn-ea"/>
+                <a:cs typeface="+mn-cs"/>
+                <a:sym typeface="Helvetica Neue"/>
+              </a:defRPr>
+            </a:lvl6pPr>
+            <a:lvl7pPr marL="0" marR="0" indent="2743200" algn="l" defTabSz="587022" rtl="0" latinLnBrk="0">
+              <a:lnSpc>
+                <a:spcPct val="100000"/>
+              </a:lnSpc>
+              <a:spcBef>
+                <a:spcPts val="0"/>
+              </a:spcBef>
+              <a:spcAft>
+                <a:spcPts val="0"/>
+              </a:spcAft>
+              <a:buClrTx/>
+              <a:buSzTx/>
+              <a:buFontTx/>
+              <a:buNone/>
+              <a:tabLst/>
+              <a:defRPr sz="3800" b="1" i="0" u="none" strike="noStrike" cap="none" spc="0" baseline="0">
+                <a:solidFill>
+                  <a:srgbClr val="000000"/>
+                </a:solidFill>
+                <a:uFillTx/>
+                <a:latin typeface="+mn-lt"/>
+                <a:ea typeface="+mn-ea"/>
+                <a:cs typeface="+mn-cs"/>
+                <a:sym typeface="Helvetica Neue"/>
+              </a:defRPr>
+            </a:lvl7pPr>
+            <a:lvl8pPr marL="0" marR="0" indent="3200400" algn="l" defTabSz="587022" rtl="0" latinLnBrk="0">
+              <a:lnSpc>
+                <a:spcPct val="100000"/>
+              </a:lnSpc>
+              <a:spcBef>
+                <a:spcPts val="0"/>
+              </a:spcBef>
+              <a:spcAft>
+                <a:spcPts val="0"/>
+              </a:spcAft>
+              <a:buClrTx/>
+              <a:buSzTx/>
+              <a:buFontTx/>
+              <a:buNone/>
+              <a:tabLst/>
+              <a:defRPr sz="3800" b="1" i="0" u="none" strike="noStrike" cap="none" spc="0" baseline="0">
+                <a:solidFill>
+                  <a:srgbClr val="000000"/>
+                </a:solidFill>
+                <a:uFillTx/>
+                <a:latin typeface="+mn-lt"/>
+                <a:ea typeface="+mn-ea"/>
+                <a:cs typeface="+mn-cs"/>
+                <a:sym typeface="Helvetica Neue"/>
+              </a:defRPr>
+            </a:lvl8pPr>
+            <a:lvl9pPr marL="0" marR="0" indent="3657600" algn="l" defTabSz="587022" rtl="0" latinLnBrk="0">
+              <a:lnSpc>
+                <a:spcPct val="100000"/>
+              </a:lnSpc>
+              <a:spcBef>
+                <a:spcPts val="0"/>
+              </a:spcBef>
+              <a:spcAft>
+                <a:spcPts val="0"/>
+              </a:spcAft>
+              <a:buClrTx/>
+              <a:buSzTx/>
+              <a:buFontTx/>
+              <a:buNone/>
+              <a:tabLst/>
+              <a:defRPr sz="3800" b="1" i="0" u="none" strike="noStrike" cap="none" spc="0" baseline="0">
+                <a:solidFill>
+                  <a:srgbClr val="000000"/>
+                </a:solidFill>
+                <a:uFillTx/>
+                <a:latin typeface="+mn-lt"/>
+                <a:ea typeface="+mn-ea"/>
+                <a:cs typeface="+mn-cs"/>
+                <a:sym typeface="Helvetica Neue"/>
+              </a:defRPr>
+            </a:lvl9pPr>
+          </a:lstStyle>
+          <a:p>
+            <a:pPr hangingPunct="1"/>
+            <a:r>
+              <a:rPr lang="en-US" dirty="0"/>
+              <a:t>Technical debt is a contingent liability whose impact is limited to internal system qualities—­primarily, but not only, maintainability and evolvability.</a:t>
             </a:r>
           </a:p>
         </p:txBody>
@@ -12479,7 +13498,7 @@
 </p:sld>
 </file>
 
-<file path=ppt/slides/slide2.xml><?xml version="1.0" encoding="utf-8"?>
+<file path=ppt/slides/slide21.xml><?xml version="1.0" encoding="utf-8"?>
 <p:sld xmlns:a="http://schemas.openxmlformats.org/drawingml/2006/main" xmlns:r="http://schemas.openxmlformats.org/officeDocument/2006/relationships" xmlns:p="http://schemas.openxmlformats.org/presentationml/2006/main">
   <p:cSld>
     <p:spTree>
@@ -12498,152 +13517,6 @@
       </p:grpSpPr>
       <p:sp>
         <p:nvSpPr>
-          <p:cNvPr id="138" name="Learning Goals"/>
-          <p:cNvSpPr txBox="1">
-            <a:spLocks noGrp="1"/>
-          </p:cNvSpPr>
-          <p:nvPr>
-            <p:ph type="title"/>
-          </p:nvPr>
-        </p:nvSpPr>
-        <p:spPr>
-          <a:prstGeom prst="rect">
-            <a:avLst/>
-          </a:prstGeom>
-        </p:spPr>
-        <p:txBody>
-          <a:bodyPr/>
-          <a:lstStyle>
-            <a:lvl1pPr defTabSz="1369804">
-              <a:defRPr sz="4740" spc="-94"/>
-            </a:lvl1pPr>
-          </a:lstStyle>
-          <a:p>
-            <a:r>
-              <a:t>Learning Goals</a:t>
-            </a:r>
-          </a:p>
-        </p:txBody>
-      </p:sp>
-      <p:sp>
-        <p:nvSpPr>
-          <p:cNvPr id="139" name="By the end of this lesson, you should be able to…"/>
-          <p:cNvSpPr txBox="1">
-            <a:spLocks noGrp="1"/>
-          </p:cNvSpPr>
-          <p:nvPr>
-            <p:ph type="body" idx="21"/>
-          </p:nvPr>
-        </p:nvSpPr>
-        <p:spPr>
-          <a:prstGeom prst="rect">
-            <a:avLst/>
-          </a:prstGeom>
-          <a:extLst>
-            <a:ext uri="{C572A759-6A51-4108-AA02-DFA0A04FC94B}">
-              <ma14:wrappingTextBoxFlag xmlns="" xmlns:m="http://schemas.openxmlformats.org/officeDocument/2006/math" xmlns:a14="http://schemas.microsoft.com/office/drawing/2010/main" xmlns:ma14="http://schemas.microsoft.com/office/mac/drawingml/2011/main" val="1"/>
-            </a:ext>
-          </a:extLst>
-        </p:spPr>
-        <p:txBody>
-          <a:bodyPr>
-            <a:normAutofit lnSpcReduction="10000"/>
-          </a:bodyPr>
-          <a:lstStyle>
-            <a:lvl1pPr>
-              <a:defRPr>
-                <a:solidFill>
-                  <a:srgbClr val="005493"/>
-                </a:solidFill>
-              </a:defRPr>
-            </a:lvl1pPr>
-          </a:lstStyle>
-          <a:p>
-            <a:r>
-              <a:rPr dirty="0"/>
-              <a:t>By the end of this lesson, you should be able to…</a:t>
-            </a:r>
-          </a:p>
-        </p:txBody>
-      </p:sp>
-      <p:sp>
-        <p:nvSpPr>
-          <p:cNvPr id="140" name="Apply refactoring techniques to improve code quality…"/>
-          <p:cNvSpPr txBox="1">
-            <a:spLocks noGrp="1"/>
-          </p:cNvSpPr>
-          <p:nvPr>
-            <p:ph type="body" idx="1"/>
-          </p:nvPr>
-        </p:nvSpPr>
-        <p:spPr>
-          <a:prstGeom prst="rect">
-            <a:avLst/>
-          </a:prstGeom>
-        </p:spPr>
-        <p:txBody>
-          <a:bodyPr/>
-          <a:lstStyle/>
-          <a:p>
-            <a:pPr marL="514350" indent="-514350">
-              <a:buFont typeface="+mj-lt"/>
-              <a:buAutoNum type="arabicPeriod"/>
-            </a:pPr>
-            <a:r>
-              <a:rPr lang="en-US" dirty="0"/>
-              <a:t>Some common code “smells” (anti-patterns).</a:t>
-            </a:r>
-          </a:p>
-          <a:p>
-            <a:pPr marL="514350" indent="-514350">
-              <a:buFont typeface="+mj-lt"/>
-              <a:buAutoNum type="arabicPeriod"/>
-            </a:pPr>
-            <a:r>
-              <a:rPr lang="en-US" dirty="0"/>
-              <a:t>“Refactoring”: restructuring of code to improve structure.</a:t>
-            </a:r>
-          </a:p>
-          <a:p>
-            <a:pPr marL="514350" indent="-514350">
-              <a:buFont typeface="+mj-lt"/>
-              <a:buAutoNum type="arabicPeriod"/>
-            </a:pPr>
-            <a:r>
-              <a:rPr lang="en-US" dirty="0"/>
-              <a:t>“Technical Debt”: generalization covering all internal problems in a code-base.</a:t>
-            </a:r>
-          </a:p>
-        </p:txBody>
-      </p:sp>
-    </p:spTree>
-  </p:cSld>
-  <p:clrMapOvr>
-    <a:masterClrMapping/>
-  </p:clrMapOvr>
-  <p:transition spd="med"/>
-</p:sld>
-</file>
-
-<file path=ppt/slides/slide20.xml><?xml version="1.0" encoding="utf-8"?>
-<p:sld xmlns:a="http://schemas.openxmlformats.org/drawingml/2006/main" xmlns:r="http://schemas.openxmlformats.org/officeDocument/2006/relationships" xmlns:p="http://schemas.openxmlformats.org/presentationml/2006/main">
-  <p:cSld>
-    <p:spTree>
-      <p:nvGrpSpPr>
-        <p:cNvPr id="1" name=""/>
-        <p:cNvGrpSpPr/>
-        <p:nvPr/>
-      </p:nvGrpSpPr>
-      <p:grpSpPr>
-        <a:xfrm>
-          <a:off x="0" y="0"/>
-          <a:ext cx="0" cy="0"/>
-          <a:chOff x="0" y="0"/>
-          <a:chExt cx="0" cy="0"/>
-        </a:xfrm>
-      </p:grpSpPr>
-      <p:sp>
-        <p:nvSpPr>
           <p:cNvPr id="3" name="Text Placeholder 2">
             <a:extLst>
               <a:ext uri="{FF2B5EF4-FFF2-40B4-BE49-F238E27FC236}">
@@ -12660,11 +13533,13 @@
         </p:nvSpPr>
         <p:spPr/>
         <p:txBody>
-          <a:bodyPr/>
+          <a:bodyPr>
+            <a:normAutofit/>
+          </a:bodyPr>
           <a:lstStyle/>
           <a:p>
             <a:r>
-              <a:rPr lang="en-US" dirty="0"/>
+              <a:rPr lang="en-US" sz="3200" dirty="0"/>
               <a:t>Example of Debt</a:t>
             </a:r>
           </a:p>
@@ -12688,40 +13563,42 @@
         </p:nvSpPr>
         <p:spPr/>
         <p:txBody>
-          <a:bodyPr/>
+          <a:bodyPr>
+            <a:normAutofit/>
+          </a:bodyPr>
           <a:lstStyle/>
           <a:p>
             <a:pPr fontAlgn="base"/>
             <a:r>
-              <a:rPr lang="en-US" dirty="0"/>
+              <a:rPr lang="en-US" sz="3200" dirty="0"/>
               <a:t>Code Smells;</a:t>
             </a:r>
           </a:p>
           <a:p>
             <a:pPr fontAlgn="base"/>
             <a:r>
-              <a:rPr lang="en-US" dirty="0"/>
+              <a:rPr lang="en-US" sz="3200" dirty="0"/>
               <a:t>Missing tests;</a:t>
             </a:r>
           </a:p>
           <a:p>
             <a:pPr fontAlgn="base"/>
             <a:r>
-              <a:rPr lang="en-US" dirty="0"/>
+              <a:rPr lang="en-US" sz="3200" dirty="0"/>
               <a:t>Missing documentation;</a:t>
             </a:r>
           </a:p>
           <a:p>
             <a:pPr fontAlgn="base"/>
             <a:r>
-              <a:rPr lang="en-US" dirty="0"/>
+              <a:rPr lang="en-US" sz="3200" dirty="0"/>
               <a:t>Dependency on old versions of third-party systems;</a:t>
             </a:r>
           </a:p>
           <a:p>
             <a:pPr fontAlgn="base"/>
             <a:r>
-              <a:rPr lang="en-US" dirty="0"/>
+              <a:rPr lang="en-US" sz="3200" dirty="0"/>
               <a:t>Inefficient and/or non-scalable algorithms.</a:t>
             </a:r>
           </a:p>
@@ -12745,11 +13622,13 @@
         </p:nvSpPr>
         <p:spPr/>
         <p:txBody>
-          <a:bodyPr/>
+          <a:bodyPr>
+            <a:normAutofit/>
+          </a:bodyPr>
           <a:lstStyle/>
           <a:p>
             <a:r>
-              <a:rPr lang="en-US" dirty="0"/>
+              <a:rPr lang="en-US" sz="3200" dirty="0"/>
               <a:t>Example of Cost</a:t>
             </a:r>
           </a:p>
@@ -12773,35 +13652,37 @@
         </p:nvSpPr>
         <p:spPr/>
         <p:txBody>
-          <a:bodyPr/>
+          <a:bodyPr>
+            <a:normAutofit/>
+          </a:bodyPr>
           <a:lstStyle/>
           <a:p>
             <a:r>
-              <a:rPr lang="en-US" dirty="0"/>
+              <a:rPr lang="en-US" sz="3200" dirty="0"/>
               <a:t>“Smelly” code is less flexible;</a:t>
             </a:r>
           </a:p>
           <a:p>
             <a:r>
-              <a:rPr lang="en-US" dirty="0"/>
+              <a:rPr lang="en-US" sz="3200" dirty="0"/>
               <a:t>Need to revert breaking change;</a:t>
             </a:r>
           </a:p>
           <a:p>
             <a:r>
-              <a:rPr lang="en-US" dirty="0"/>
+              <a:rPr lang="en-US" sz="3200" dirty="0"/>
               <a:t>Can’t figure out how to use;</a:t>
             </a:r>
           </a:p>
           <a:p>
             <a:r>
-              <a:rPr lang="en-US" dirty="0"/>
+              <a:rPr lang="en-US" sz="3200" dirty="0"/>
               <a:t>May have take over maintenance of old system;</a:t>
             </a:r>
           </a:p>
           <a:p>
             <a:r>
-              <a:rPr lang="en-US" dirty="0"/>
+              <a:rPr lang="en-US" sz="3200" dirty="0"/>
               <a:t>Lose potential customers.</a:t>
             </a:r>
           </a:p>
@@ -12839,7 +13720,7 @@
                 <a:latin typeface="Calibri" panose="020F0502020204030204"/>
               </a:rPr>
               <a:pPr defTabSz="975390" hangingPunct="1"/>
-              <a:t>20</a:t>
+              <a:t>21</a:t>
             </a:fld>
             <a:endParaRPr lang="en-US" kern="1200">
               <a:solidFill>
@@ -12879,7 +13760,7 @@
           </a:ln>
           <a:extLst>
             <a:ext uri="{C572A759-6A51-4108-AA02-DFA0A04FC94B}">
-              <ma14:wrappingTextBoxFlag xmlns="" xmlns:m="http://schemas.openxmlformats.org/officeDocument/2006/math" xmlns:a14="http://schemas.microsoft.com/office/drawing/2010/main" xmlns:ma14="http://schemas.microsoft.com/office/mac/drawingml/2011/main" val="1"/>
+              <ma14:wrappingTextBoxFlag xmlns:ma14="http://schemas.microsoft.com/office/mac/drawingml/2011/main" xmlns:a14="http://schemas.microsoft.com/office/drawing/2010/main" xmlns:m="http://schemas.openxmlformats.org/officeDocument/2006/math" xmlns="" val="1"/>
             </a:ext>
           </a:extLst>
         </p:spPr>
@@ -13445,7 +14326,7 @@
 </p:sld>
 </file>
 
-<file path=ppt/slides/slide21.xml><?xml version="1.0" encoding="utf-8"?>
+<file path=ppt/slides/slide22.xml><?xml version="1.0" encoding="utf-8"?>
 <p:sld xmlns:a="http://schemas.openxmlformats.org/drawingml/2006/main" xmlns:r="http://schemas.openxmlformats.org/officeDocument/2006/relationships" xmlns:p="http://schemas.openxmlformats.org/presentationml/2006/main">
   <p:cSld>
     <p:spTree>
@@ -13478,66 +14359,73 @@
             <p:ph idx="1"/>
           </p:nvPr>
         </p:nvSpPr>
-        <p:spPr/>
-        <p:txBody>
-          <a:bodyPr/>
+        <p:spPr>
+          <a:xfrm>
+            <a:off x="894080" y="2133561"/>
+            <a:ext cx="10931127" cy="6188570"/>
+          </a:xfrm>
+        </p:spPr>
+        <p:txBody>
+          <a:bodyPr>
+            <a:normAutofit/>
+          </a:bodyPr>
           <a:lstStyle/>
           <a:p>
             <a:r>
-              <a:rPr lang="en-US" dirty="0"/>
+              <a:rPr lang="en-US" sz="3600" dirty="0"/>
               <a:t>Prototyping:</a:t>
             </a:r>
           </a:p>
           <a:p>
             <a:pPr lvl="1"/>
             <a:r>
-              <a:rPr lang="en-US" dirty="0"/>
+              <a:rPr lang="en-US" sz="3200" dirty="0"/>
               <a:t>If code will be discarded, or drastically rewritten, don’t waste time perfecting it.</a:t>
             </a:r>
           </a:p>
           <a:p>
             <a:r>
-              <a:rPr lang="en-US" dirty="0"/>
+              <a:rPr lang="en-US" sz="3600" dirty="0"/>
               <a:t>Getting a product out the door:</a:t>
             </a:r>
           </a:p>
           <a:p>
             <a:pPr lvl="1"/>
             <a:r>
-              <a:rPr lang="en-US" dirty="0"/>
+              <a:rPr lang="en-US" sz="3200" dirty="0"/>
               <a:t>Time is often crucial in a competitive environment.</a:t>
             </a:r>
           </a:p>
           <a:p>
             <a:r>
-              <a:rPr lang="en-US" dirty="0"/>
+              <a:rPr lang="en-US" sz="3600" dirty="0"/>
               <a:t>Fixing a critical failure:</a:t>
             </a:r>
           </a:p>
           <a:p>
             <a:pPr lvl="1"/>
             <a:r>
-              <a:rPr lang="en-US" dirty="0"/>
+              <a:rPr lang="en-US" sz="3200" dirty="0"/>
               <a:t>People are waiting.</a:t>
             </a:r>
           </a:p>
           <a:p>
             <a:r>
-              <a:rPr lang="en-US" dirty="0"/>
+              <a:rPr lang="en-US" sz="3600" dirty="0"/>
               <a:t>Maybe a simple algorithm is good enough:</a:t>
             </a:r>
           </a:p>
           <a:p>
             <a:pPr lvl="1"/>
             <a:r>
-              <a:rPr lang="en-US" dirty="0"/>
+              <a:rPr lang="en-US" sz="3200" dirty="0"/>
               <a:t>“Premature optimization is the root of all evil”</a:t>
             </a:r>
           </a:p>
           <a:p>
             <a:pPr lvl="2"/>
             <a:r>
-              <a:rPr lang="en-US" dirty="0"/>
+              <a:rPr lang="en-US" sz="2800" dirty="0"/>
               <a:t>Tony Hoare, Donald Knuth</a:t>
             </a:r>
           </a:p>
@@ -13575,7 +14463,7 @@
                 <a:latin typeface="Calibri" panose="020F0502020204030204"/>
               </a:rPr>
               <a:pPr defTabSz="975390" hangingPunct="1"/>
-              <a:t>21</a:t>
+              <a:t>22</a:t>
             </a:fld>
             <a:endParaRPr lang="en-US" kern="1200">
               <a:solidFill>
@@ -13615,7 +14503,7 @@
           </a:ln>
           <a:extLst>
             <a:ext uri="{C572A759-6A51-4108-AA02-DFA0A04FC94B}">
-              <ma14:wrappingTextBoxFlag xmlns="" xmlns:m="http://schemas.openxmlformats.org/officeDocument/2006/math" xmlns:a14="http://schemas.microsoft.com/office/drawing/2010/main" xmlns:ma14="http://schemas.microsoft.com/office/mac/drawingml/2011/main" val="1"/>
+              <ma14:wrappingTextBoxFlag xmlns:ma14="http://schemas.microsoft.com/office/mac/drawingml/2011/main" xmlns:a14="http://schemas.microsoft.com/office/drawing/2010/main" xmlns:m="http://schemas.openxmlformats.org/officeDocument/2006/math" xmlns="" val="1"/>
             </a:ext>
           </a:extLst>
         </p:spPr>
@@ -13906,7 +14794,7 @@
 </p:sld>
 </file>
 
-<file path=ppt/slides/slide22.xml><?xml version="1.0" encoding="utf-8"?>
+<file path=ppt/slides/slide23.xml><?xml version="1.0" encoding="utf-8"?>
 <p:sld xmlns:a="http://schemas.openxmlformats.org/drawingml/2006/main" xmlns:r="http://schemas.openxmlformats.org/officeDocument/2006/relationships" xmlns:p="http://schemas.openxmlformats.org/presentationml/2006/main">
   <p:cSld>
     <p:spTree>
@@ -14067,7 +14955,7 @@
                 <a:latin typeface="Calibri" panose="020F0502020204030204"/>
               </a:rPr>
               <a:pPr defTabSz="975390" hangingPunct="1"/>
-              <a:t>22</a:t>
+              <a:t>23</a:t>
             </a:fld>
             <a:endParaRPr lang="en-US" kern="1200">
               <a:solidFill>
@@ -14596,7 +15484,7 @@
           </a:ln>
           <a:extLst>
             <a:ext uri="{C572A759-6A51-4108-AA02-DFA0A04FC94B}">
-              <ma14:wrappingTextBoxFlag xmlns="" xmlns:m="http://schemas.openxmlformats.org/officeDocument/2006/math" xmlns:a14="http://schemas.microsoft.com/office/drawing/2010/main" xmlns:ma14="http://schemas.microsoft.com/office/mac/drawingml/2011/main" val="1"/>
+              <ma14:wrappingTextBoxFlag xmlns:ma14="http://schemas.microsoft.com/office/mac/drawingml/2011/main" xmlns:a14="http://schemas.microsoft.com/office/drawing/2010/main" xmlns:m="http://schemas.openxmlformats.org/officeDocument/2006/math" xmlns="" val="1"/>
             </a:ext>
           </a:extLst>
         </p:spPr>
@@ -14887,7 +15775,7 @@
 </p:sld>
 </file>
 
-<file path=ppt/slides/slide23.xml><?xml version="1.0" encoding="utf-8"?>
+<file path=ppt/slides/slide24.xml><?xml version="1.0" encoding="utf-8"?>
 <p:sld xmlns:a="http://schemas.openxmlformats.org/drawingml/2006/main" xmlns:r="http://schemas.openxmlformats.org/officeDocument/2006/relationships" xmlns:p="http://schemas.openxmlformats.org/presentationml/2006/main">
   <p:cSld>
     <p:spTree>
@@ -15038,7 +15926,7 @@
                 <a:latin typeface="Calibri" panose="020F0502020204030204"/>
               </a:rPr>
               <a:pPr defTabSz="975390" hangingPunct="1"/>
-              <a:t>23</a:t>
+              <a:t>24</a:t>
             </a:fld>
             <a:endParaRPr lang="en-US" kern="1200">
               <a:solidFill>
@@ -15398,7 +16286,7 @@
             </a:r>
           </a:p>
           <a:p>
-            <a:pPr marL="393192" indent="-393192" defTabSz="1491179">
+            <a:pPr marL="1002792" lvl="1" indent="-393192" defTabSz="1491179">
               <a:spcBef>
                 <a:spcPts val="800"/>
               </a:spcBef>
@@ -15416,7 +16304,7 @@
             </a:r>
           </a:p>
           <a:p>
-            <a:pPr marL="393192" indent="-393192" defTabSz="1491179">
+            <a:pPr marL="1002792" lvl="1" indent="-393192" defTabSz="1491179">
               <a:spcBef>
                 <a:spcPts val="800"/>
               </a:spcBef>
@@ -15434,7 +16322,7 @@
             </a:r>
           </a:p>
           <a:p>
-            <a:pPr marL="393192" indent="-393192" defTabSz="1491179">
+            <a:pPr marL="1002792" lvl="1" indent="-393192" defTabSz="1491179">
               <a:spcBef>
                 <a:spcPts val="800"/>
               </a:spcBef>
@@ -15452,7 +16340,7 @@
             </a:r>
           </a:p>
           <a:p>
-            <a:pPr marL="393192" indent="-393192" defTabSz="1491179">
+            <a:pPr marL="1002792" lvl="1" indent="-393192" defTabSz="1491179">
               <a:spcBef>
                 <a:spcPts val="800"/>
               </a:spcBef>
@@ -15602,6 +16490,7 @@
               <a:defRPr sz="2937"/>
             </a:pPr>
             <a:r>
+              <a:rPr dirty="0"/>
               <a:t>refactoring is something good programmers have always done</a:t>
             </a:r>
           </a:p>
@@ -15614,6 +16503,7 @@
               <a:defRPr sz="2937"/>
             </a:pPr>
             <a:r>
+              <a:rPr dirty="0"/>
               <a:t>Opdyke’s PhD thesis (1990): refactoring tools for Smalltalk</a:t>
             </a:r>
           </a:p>
@@ -15626,8 +16516,19 @@
               <a:defRPr sz="2937"/>
             </a:pPr>
             <a:r>
+              <a:rPr dirty="0"/>
               <a:t>popularized by various agile development methodologies</a:t>
             </a:r>
+          </a:p>
+          <a:p>
+            <a:pPr marL="0" indent="0" defTabSz="1543197">
+              <a:spcBef>
+                <a:spcPts val="800"/>
+              </a:spcBef>
+              <a:buNone/>
+              <a:defRPr sz="2937"/>
+            </a:pPr>
+            <a:endParaRPr dirty="0"/>
           </a:p>
           <a:p>
             <a:pPr marL="406908" indent="-406908" defTabSz="1543197">
@@ -15636,25 +16537,8 @@
               </a:spcBef>
               <a:defRPr sz="2937"/>
             </a:pPr>
-            <a:endParaRPr/>
-          </a:p>
-          <a:p>
-            <a:pPr marL="406908" indent="-406908" defTabSz="1543197">
-              <a:spcBef>
-                <a:spcPts val="800"/>
-              </a:spcBef>
-              <a:defRPr sz="2937"/>
-            </a:pPr>
-            <a:endParaRPr/>
-          </a:p>
-          <a:p>
-            <a:pPr marL="406908" indent="-406908" defTabSz="1543197">
-              <a:spcBef>
-                <a:spcPts val="800"/>
-              </a:spcBef>
-              <a:defRPr sz="2937"/>
-            </a:pPr>
-            <a:r>
+            <a:r>
+              <a:rPr dirty="0"/>
               <a:t>especially popular in the context of object-oriented languages</a:t>
             </a:r>
           </a:p>
@@ -15667,6 +16551,7 @@
               <a:defRPr sz="2937"/>
             </a:pPr>
             <a:r>
+              <a:rPr dirty="0"/>
               <a:t>OO features are well-suited to make designs flexible &amp; reusable </a:t>
             </a:r>
           </a:p>
@@ -15679,6 +16564,7 @@
               <a:defRPr sz="2937"/>
             </a:pPr>
             <a:r>
+              <a:rPr dirty="0"/>
               <a:t>but refactoring is not specific to OO</a:t>
             </a:r>
           </a:p>
@@ -15755,7 +16641,7 @@
           </a:prstGeom>
           <a:extLst>
             <a:ext uri="{C572A759-6A51-4108-AA02-DFA0A04FC94B}">
-              <ma14:wrappingTextBoxFlag xmlns="" xmlns:m="http://schemas.openxmlformats.org/officeDocument/2006/math" xmlns:a14="http://schemas.microsoft.com/office/drawing/2010/main" xmlns:ma14="http://schemas.microsoft.com/office/mac/drawingml/2011/main" val="1"/>
+              <ma14:wrappingTextBoxFlag xmlns:ma14="http://schemas.microsoft.com/office/mac/drawingml/2011/main" xmlns:a14="http://schemas.microsoft.com/office/drawing/2010/main" xmlns:m="http://schemas.openxmlformats.org/officeDocument/2006/math" xmlns="" val="1"/>
             </a:ext>
           </a:extLst>
         </p:spPr>
@@ -15813,7 +16699,7 @@
           </a:ln>
           <a:extLst>
             <a:ext uri="{C572A759-6A51-4108-AA02-DFA0A04FC94B}">
-              <ma14:wrappingTextBoxFlag xmlns="" xmlns:m="http://schemas.openxmlformats.org/officeDocument/2006/math" xmlns:a14="http://schemas.microsoft.com/office/drawing/2010/main" xmlns:ma14="http://schemas.microsoft.com/office/mac/drawingml/2011/main" val="1"/>
+              <ma14:wrappingTextBoxFlag xmlns:ma14="http://schemas.microsoft.com/office/mac/drawingml/2011/main" xmlns:a14="http://schemas.microsoft.com/office/drawing/2010/main" xmlns:m="http://schemas.openxmlformats.org/officeDocument/2006/math" xmlns="" val="1"/>
             </a:ext>
           </a:extLst>
         </p:spPr>
@@ -16365,7 +17251,7 @@
           </a:prstGeom>
           <a:extLst>
             <a:ext uri="{C572A759-6A51-4108-AA02-DFA0A04FC94B}">
-              <ma14:wrappingTextBoxFlag xmlns="" xmlns:m="http://schemas.openxmlformats.org/officeDocument/2006/math" xmlns:a14="http://schemas.microsoft.com/office/drawing/2010/main" xmlns:ma14="http://schemas.microsoft.com/office/mac/drawingml/2011/main" val="1"/>
+              <ma14:wrappingTextBoxFlag xmlns:ma14="http://schemas.microsoft.com/office/mac/drawingml/2011/main" xmlns:a14="http://schemas.microsoft.com/office/drawing/2010/main" xmlns:m="http://schemas.openxmlformats.org/officeDocument/2006/math" xmlns="" val="1"/>
             </a:ext>
           </a:extLst>
         </p:spPr>
@@ -16400,7 +17286,7 @@
           </a:ln>
           <a:extLst>
             <a:ext uri="{C572A759-6A51-4108-AA02-DFA0A04FC94B}">
-              <ma14:wrappingTextBoxFlag xmlns="" xmlns:m="http://schemas.openxmlformats.org/officeDocument/2006/math" xmlns:a14="http://schemas.microsoft.com/office/drawing/2010/main" xmlns:ma14="http://schemas.microsoft.com/office/mac/drawingml/2011/main" val="1"/>
+              <ma14:wrappingTextBoxFlag xmlns:ma14="http://schemas.microsoft.com/office/mac/drawingml/2011/main" xmlns:a14="http://schemas.microsoft.com/office/drawing/2010/main" xmlns:m="http://schemas.openxmlformats.org/officeDocument/2006/math" xmlns="" val="1"/>
             </a:ext>
           </a:extLst>
         </p:spPr>
@@ -16588,7 +17474,7 @@
           </a:ln>
           <a:extLst>
             <a:ext uri="{C572A759-6A51-4108-AA02-DFA0A04FC94B}">
-              <ma14:wrappingTextBoxFlag xmlns="" xmlns:m="http://schemas.openxmlformats.org/officeDocument/2006/math" xmlns:a14="http://schemas.microsoft.com/office/drawing/2010/main" xmlns:ma14="http://schemas.microsoft.com/office/mac/drawingml/2011/main" val="1"/>
+              <ma14:wrappingTextBoxFlag xmlns:ma14="http://schemas.microsoft.com/office/mac/drawingml/2011/main" xmlns:a14="http://schemas.microsoft.com/office/drawing/2010/main" xmlns:m="http://schemas.openxmlformats.org/officeDocument/2006/math" xmlns="" val="1"/>
             </a:ext>
           </a:extLst>
         </p:spPr>
@@ -16760,7 +17646,7 @@
           </a:ln>
           <a:extLst>
             <a:ext uri="{C572A759-6A51-4108-AA02-DFA0A04FC94B}">
-              <ma14:wrappingTextBoxFlag xmlns="" xmlns:m="http://schemas.openxmlformats.org/officeDocument/2006/math" xmlns:a14="http://schemas.microsoft.com/office/drawing/2010/main" xmlns:ma14="http://schemas.microsoft.com/office/mac/drawingml/2011/main" val="1"/>
+              <ma14:wrappingTextBoxFlag xmlns:ma14="http://schemas.microsoft.com/office/mac/drawingml/2011/main" xmlns:a14="http://schemas.microsoft.com/office/drawing/2010/main" xmlns:m="http://schemas.openxmlformats.org/officeDocument/2006/math" xmlns="" val="1"/>
             </a:ext>
           </a:extLst>
         </p:spPr>
@@ -16803,7 +17689,7 @@
           </a:ln>
           <a:extLst>
             <a:ext uri="{C572A759-6A51-4108-AA02-DFA0A04FC94B}">
-              <ma14:wrappingTextBoxFlag xmlns="" xmlns:m="http://schemas.openxmlformats.org/officeDocument/2006/math" xmlns:a14="http://schemas.microsoft.com/office/drawing/2010/main" xmlns:ma14="http://schemas.microsoft.com/office/mac/drawingml/2011/main" val="1"/>
+              <ma14:wrappingTextBoxFlag xmlns:ma14="http://schemas.microsoft.com/office/mac/drawingml/2011/main" xmlns:a14="http://schemas.microsoft.com/office/drawing/2010/main" xmlns:m="http://schemas.openxmlformats.org/officeDocument/2006/math" xmlns="" val="1"/>
             </a:ext>
           </a:extLst>
         </p:spPr>

</xml_diff>